<commit_message>
Changes to saved variables in analyze_performance.py
</commit_message>
<xml_diff>
--- a/common/mbi_flowchart.pptx
+++ b/common/mbi_flowchart.pptx
@@ -1,117 +1,3 @@
-
-<file path=ppt/presentation.xml><?xml version="1.0" encoding="utf-8"?>
-<p:presentation xmlns:a="http://schemas.openxmlformats.org/drawingml/2006/main" xmlns:r="http://schemas.openxmlformats.org/officeDocument/2006/relationships" xmlns:p="http://schemas.openxmlformats.org/presentationml/2006/main" saveSubsetFonts="1">
-  <p:sldMasterIdLst>
-    <p:sldMasterId id="2147483648" r:id="rId1"/>
-  </p:sldMasterIdLst>
-  <p:sldIdLst>
-    <p:sldId id="257" r:id="rId2"/>
-    <p:sldId id="258" r:id="rId3"/>
-  </p:sldIdLst>
-  <p:sldSz cx="12192000" cy="6858000"/>
-  <p:notesSz cx="6858000" cy="9144000"/>
-  <p:defaultTextStyle>
-    <a:defPPr>
-      <a:defRPr lang="en-US"/>
-    </a:defPPr>
-    <a:lvl1pPr marL="0" algn="l" defTabSz="914400" rtl="0" eaLnBrk="1" latinLnBrk="0" hangingPunct="1">
-      <a:defRPr sz="1800" kern="1200">
-        <a:solidFill>
-          <a:schemeClr val="tx1"/>
-        </a:solidFill>
-        <a:latin typeface="+mn-lt"/>
-        <a:ea typeface="+mn-ea"/>
-        <a:cs typeface="+mn-cs"/>
-      </a:defRPr>
-    </a:lvl1pPr>
-    <a:lvl2pPr marL="457200" algn="l" defTabSz="914400" rtl="0" eaLnBrk="1" latinLnBrk="0" hangingPunct="1">
-      <a:defRPr sz="1800" kern="1200">
-        <a:solidFill>
-          <a:schemeClr val="tx1"/>
-        </a:solidFill>
-        <a:latin typeface="+mn-lt"/>
-        <a:ea typeface="+mn-ea"/>
-        <a:cs typeface="+mn-cs"/>
-      </a:defRPr>
-    </a:lvl2pPr>
-    <a:lvl3pPr marL="914400" algn="l" defTabSz="914400" rtl="0" eaLnBrk="1" latinLnBrk="0" hangingPunct="1">
-      <a:defRPr sz="1800" kern="1200">
-        <a:solidFill>
-          <a:schemeClr val="tx1"/>
-        </a:solidFill>
-        <a:latin typeface="+mn-lt"/>
-        <a:ea typeface="+mn-ea"/>
-        <a:cs typeface="+mn-cs"/>
-      </a:defRPr>
-    </a:lvl3pPr>
-    <a:lvl4pPr marL="1371600" algn="l" defTabSz="914400" rtl="0" eaLnBrk="1" latinLnBrk="0" hangingPunct="1">
-      <a:defRPr sz="1800" kern="1200">
-        <a:solidFill>
-          <a:schemeClr val="tx1"/>
-        </a:solidFill>
-        <a:latin typeface="+mn-lt"/>
-        <a:ea typeface="+mn-ea"/>
-        <a:cs typeface="+mn-cs"/>
-      </a:defRPr>
-    </a:lvl4pPr>
-    <a:lvl5pPr marL="1828800" algn="l" defTabSz="914400" rtl="0" eaLnBrk="1" latinLnBrk="0" hangingPunct="1">
-      <a:defRPr sz="1800" kern="1200">
-        <a:solidFill>
-          <a:schemeClr val="tx1"/>
-        </a:solidFill>
-        <a:latin typeface="+mn-lt"/>
-        <a:ea typeface="+mn-ea"/>
-        <a:cs typeface="+mn-cs"/>
-      </a:defRPr>
-    </a:lvl5pPr>
-    <a:lvl6pPr marL="2286000" algn="l" defTabSz="914400" rtl="0" eaLnBrk="1" latinLnBrk="0" hangingPunct="1">
-      <a:defRPr sz="1800" kern="1200">
-        <a:solidFill>
-          <a:schemeClr val="tx1"/>
-        </a:solidFill>
-        <a:latin typeface="+mn-lt"/>
-        <a:ea typeface="+mn-ea"/>
-        <a:cs typeface="+mn-cs"/>
-      </a:defRPr>
-    </a:lvl6pPr>
-    <a:lvl7pPr marL="2743200" algn="l" defTabSz="914400" rtl="0" eaLnBrk="1" latinLnBrk="0" hangingPunct="1">
-      <a:defRPr sz="1800" kern="1200">
-        <a:solidFill>
-          <a:schemeClr val="tx1"/>
-        </a:solidFill>
-        <a:latin typeface="+mn-lt"/>
-        <a:ea typeface="+mn-ea"/>
-        <a:cs typeface="+mn-cs"/>
-      </a:defRPr>
-    </a:lvl7pPr>
-    <a:lvl8pPr marL="3200400" algn="l" defTabSz="914400" rtl="0" eaLnBrk="1" latinLnBrk="0" hangingPunct="1">
-      <a:defRPr sz="1800" kern="1200">
-        <a:solidFill>
-          <a:schemeClr val="tx1"/>
-        </a:solidFill>
-        <a:latin typeface="+mn-lt"/>
-        <a:ea typeface="+mn-ea"/>
-        <a:cs typeface="+mn-cs"/>
-      </a:defRPr>
-    </a:lvl8pPr>
-    <a:lvl9pPr marL="3657600" algn="l" defTabSz="914400" rtl="0" eaLnBrk="1" latinLnBrk="0" hangingPunct="1">
-      <a:defRPr sz="1800" kern="1200">
-        <a:solidFill>
-          <a:schemeClr val="tx1"/>
-        </a:solidFill>
-        <a:latin typeface="+mn-lt"/>
-        <a:ea typeface="+mn-ea"/>
-        <a:cs typeface="+mn-cs"/>
-      </a:defRPr>
-    </a:lvl9pPr>
-  </p:defaultTextStyle>
-  <p:extLst>
-    <p:ext uri="{EFAFB233-063F-42B5-8137-9DF3F51BA10A}">
-      <p15:sldGuideLst xmlns:p15="http://schemas.microsoft.com/office/powerpoint/2012/main"/>
-    </p:ext>
-  </p:extLst>
-</p:presentation>
-</file>
 
 <file path=ppt/diagrams/colors1.xml><?xml version="1.0" encoding="utf-8"?>
 <dgm:colorsDef xmlns:dgm="http://schemas.openxmlformats.org/drawingml/2006/diagram" xmlns:a="http://schemas.openxmlformats.org/drawingml/2006/main" uniqueId="urn:microsoft.com/office/officeart/2005/8/colors/colorful5">
@@ -893,834 +779,6 @@
     <dgm:txEffectClrLst/>
   </dgm:styleLbl>
 </dgm:colorsDef>
-</file>
-
-<file path=ppt/diagrams/data1.xml><?xml version="1.0" encoding="utf-8"?>
-<dgm:dataModel xmlns:dgm="http://schemas.openxmlformats.org/drawingml/2006/diagram" xmlns:a="http://schemas.openxmlformats.org/drawingml/2006/main">
-  <dgm:ptLst>
-    <dgm:pt modelId="{D9046E42-BF76-4AED-A110-6225E534D57C}" type="doc">
-      <dgm:prSet loTypeId="urn:microsoft.com/office/officeart/2005/8/layout/vList5" loCatId="list" qsTypeId="urn:microsoft.com/office/officeart/2005/8/quickstyle/simple1" qsCatId="simple" csTypeId="urn:microsoft.com/office/officeart/2005/8/colors/colorful5" csCatId="colorful" phldr="1"/>
-      <dgm:spPr/>
-      <dgm:t>
-        <a:bodyPr/>
-        <a:lstStyle/>
-        <a:p>
-          <a:endParaRPr lang="en-US"/>
-        </a:p>
-      </dgm:t>
-    </dgm:pt>
-    <dgm:pt modelId="{E851C84F-B54D-45A0-98D7-C9DBAF425177}">
-      <dgm:prSet phldrT="[Text]"/>
-      <dgm:spPr/>
-      <dgm:t>
-        <a:bodyPr/>
-        <a:lstStyle/>
-        <a:p>
-          <a:r>
-            <a:rPr lang="en-US" dirty="0"/>
-            <a:t>Preprocessing</a:t>
-          </a:r>
-        </a:p>
-      </dgm:t>
-    </dgm:pt>
-    <dgm:pt modelId="{C2B5E7EB-5CD5-4C5B-88FD-4B07FCC3E98F}" type="parTrans" cxnId="{AAFF56A9-E10C-4F39-A53D-0C7DBC8B1AD4}">
-      <dgm:prSet/>
-      <dgm:spPr/>
-      <dgm:t>
-        <a:bodyPr/>
-        <a:lstStyle/>
-        <a:p>
-          <a:endParaRPr lang="en-US"/>
-        </a:p>
-      </dgm:t>
-    </dgm:pt>
-    <dgm:pt modelId="{96AC5923-1A4B-4A13-BF87-C098C349DA8B}" type="sibTrans" cxnId="{AAFF56A9-E10C-4F39-A53D-0C7DBC8B1AD4}">
-      <dgm:prSet/>
-      <dgm:spPr/>
-      <dgm:t>
-        <a:bodyPr/>
-        <a:lstStyle/>
-        <a:p>
-          <a:endParaRPr lang="en-US"/>
-        </a:p>
-      </dgm:t>
-    </dgm:pt>
-    <dgm:pt modelId="{80F839E1-03FA-4B70-81A8-83EA7C2CC0F3}">
-      <dgm:prSet phldrT="[Text]"/>
-      <dgm:spPr/>
-      <dgm:t>
-        <a:bodyPr/>
-        <a:lstStyle/>
-        <a:p>
-          <a:r>
-            <a:rPr lang="en-US" dirty="0"/>
-            <a:t>Bad frame detection</a:t>
-          </a:r>
-        </a:p>
-      </dgm:t>
-    </dgm:pt>
-    <dgm:pt modelId="{689B7092-48EB-452C-9F63-930CBCE78914}" type="parTrans" cxnId="{F1CC822E-4FD2-4B29-A3D4-3735AECD3191}">
-      <dgm:prSet/>
-      <dgm:spPr/>
-      <dgm:t>
-        <a:bodyPr/>
-        <a:lstStyle/>
-        <a:p>
-          <a:endParaRPr lang="en-US"/>
-        </a:p>
-      </dgm:t>
-    </dgm:pt>
-    <dgm:pt modelId="{C8696FAA-5D16-4357-95CB-7F763CD6F86A}" type="sibTrans" cxnId="{F1CC822E-4FD2-4B29-A3D4-3735AECD3191}">
-      <dgm:prSet/>
-      <dgm:spPr/>
-      <dgm:t>
-        <a:bodyPr/>
-        <a:lstStyle/>
-        <a:p>
-          <a:endParaRPr lang="en-US"/>
-        </a:p>
-      </dgm:t>
-    </dgm:pt>
-    <dgm:pt modelId="{A86FC59B-E306-4C2A-B077-CB0610CCF927}">
-      <dgm:prSet phldrT="[Text]"/>
-      <dgm:spPr/>
-      <dgm:t>
-        <a:bodyPr/>
-        <a:lstStyle/>
-        <a:p>
-          <a:r>
-            <a:rPr lang="en-US" dirty="0"/>
-            <a:t>Training</a:t>
-          </a:r>
-        </a:p>
-      </dgm:t>
-    </dgm:pt>
-    <dgm:pt modelId="{22E52C0E-9815-4689-B3CB-2B9497FE8772}" type="parTrans" cxnId="{16B1BE59-3A31-4B67-9FBE-A7CBF1C44A1C}">
-      <dgm:prSet/>
-      <dgm:spPr/>
-      <dgm:t>
-        <a:bodyPr/>
-        <a:lstStyle/>
-        <a:p>
-          <a:endParaRPr lang="en-US"/>
-        </a:p>
-      </dgm:t>
-    </dgm:pt>
-    <dgm:pt modelId="{1C6350BC-A4BC-44A8-8B89-6E297231B725}" type="sibTrans" cxnId="{16B1BE59-3A31-4B67-9FBE-A7CBF1C44A1C}">
-      <dgm:prSet/>
-      <dgm:spPr/>
-      <dgm:t>
-        <a:bodyPr/>
-        <a:lstStyle/>
-        <a:p>
-          <a:endParaRPr lang="en-US"/>
-        </a:p>
-      </dgm:t>
-    </dgm:pt>
-    <dgm:pt modelId="{2517FFFC-88AC-49A8-9078-E583813430E3}">
-      <dgm:prSet phldrT="[Text]"/>
-      <dgm:spPr/>
-      <dgm:t>
-        <a:bodyPr/>
-        <a:lstStyle/>
-        <a:p>
-          <a:r>
-            <a:rPr lang="en-US" dirty="0" err="1"/>
-            <a:t>WaveNet</a:t>
-          </a:r>
-          <a:r>
-            <a:rPr lang="en-US" dirty="0"/>
-            <a:t> or LSTM model</a:t>
-          </a:r>
-        </a:p>
-      </dgm:t>
-    </dgm:pt>
-    <dgm:pt modelId="{EC3FBB2A-E425-4F7A-8943-A7D5D7ED9D66}" type="parTrans" cxnId="{62A6F65A-885E-42DE-B1E8-6D514A15B308}">
-      <dgm:prSet/>
-      <dgm:spPr/>
-      <dgm:t>
-        <a:bodyPr/>
-        <a:lstStyle/>
-        <a:p>
-          <a:endParaRPr lang="en-US"/>
-        </a:p>
-      </dgm:t>
-    </dgm:pt>
-    <dgm:pt modelId="{C10EF163-A933-40C6-B9FF-8B156BF7B7C1}" type="sibTrans" cxnId="{62A6F65A-885E-42DE-B1E8-6D514A15B308}">
-      <dgm:prSet/>
-      <dgm:spPr/>
-      <dgm:t>
-        <a:bodyPr/>
-        <a:lstStyle/>
-        <a:p>
-          <a:endParaRPr lang="en-US"/>
-        </a:p>
-      </dgm:t>
-    </dgm:pt>
-    <dgm:pt modelId="{0FB0D465-E9EF-44D4-BD3C-36C245B0B58D}">
-      <dgm:prSet phldrT="[Text]"/>
-      <dgm:spPr/>
-      <dgm:t>
-        <a:bodyPr/>
-        <a:lstStyle/>
-        <a:p>
-          <a:r>
-            <a:rPr lang="en-US" dirty="0"/>
-            <a:t>Ensemble</a:t>
-          </a:r>
-        </a:p>
-      </dgm:t>
-    </dgm:pt>
-    <dgm:pt modelId="{9E61BD83-9A13-4E81-A5B4-9F32CC54E61C}" type="parTrans" cxnId="{33DDCE8E-A542-443E-893A-7E95B5B0BC9F}">
-      <dgm:prSet/>
-      <dgm:spPr/>
-      <dgm:t>
-        <a:bodyPr/>
-        <a:lstStyle/>
-        <a:p>
-          <a:endParaRPr lang="en-US"/>
-        </a:p>
-      </dgm:t>
-    </dgm:pt>
-    <dgm:pt modelId="{5D4B9573-7E8B-4332-BD3E-DCBA0AC19D02}" type="sibTrans" cxnId="{33DDCE8E-A542-443E-893A-7E95B5B0BC9F}">
-      <dgm:prSet/>
-      <dgm:spPr/>
-      <dgm:t>
-        <a:bodyPr/>
-        <a:lstStyle/>
-        <a:p>
-          <a:endParaRPr lang="en-US"/>
-        </a:p>
-      </dgm:t>
-    </dgm:pt>
-    <dgm:pt modelId="{FF83436B-F015-4536-84B5-659641849008}">
-      <dgm:prSet phldrT="[Text]"/>
-      <dgm:spPr/>
-      <dgm:t>
-        <a:bodyPr/>
-        <a:lstStyle/>
-        <a:p>
-          <a:r>
-            <a:rPr lang="en-US" dirty="0"/>
-            <a:t>Collect multiple models</a:t>
-          </a:r>
-        </a:p>
-      </dgm:t>
-    </dgm:pt>
-    <dgm:pt modelId="{87DEA420-E4EF-4129-976C-45430403BEDC}" type="parTrans" cxnId="{6E860625-3830-4A91-B705-B971417EC8A6}">
-      <dgm:prSet/>
-      <dgm:spPr/>
-      <dgm:t>
-        <a:bodyPr/>
-        <a:lstStyle/>
-        <a:p>
-          <a:endParaRPr lang="en-US"/>
-        </a:p>
-      </dgm:t>
-    </dgm:pt>
-    <dgm:pt modelId="{BD979954-B168-47B7-BB67-EC7F822E8384}" type="sibTrans" cxnId="{6E860625-3830-4A91-B705-B971417EC8A6}">
-      <dgm:prSet/>
-      <dgm:spPr/>
-      <dgm:t>
-        <a:bodyPr/>
-        <a:lstStyle/>
-        <a:p>
-          <a:endParaRPr lang="en-US"/>
-        </a:p>
-      </dgm:t>
-    </dgm:pt>
-    <dgm:pt modelId="{2FF53976-15B8-4292-AFAE-3197CC9E7855}">
-      <dgm:prSet phldrT="[Text]"/>
-      <dgm:spPr/>
-      <dgm:t>
-        <a:bodyPr/>
-        <a:lstStyle/>
-        <a:p>
-          <a:r>
-            <a:rPr lang="en-US" dirty="0"/>
-            <a:t>z-score Marker Data</a:t>
-          </a:r>
-        </a:p>
-      </dgm:t>
-    </dgm:pt>
-    <dgm:pt modelId="{C6EC0163-5723-450E-887B-8852FAF8A712}" type="parTrans" cxnId="{BA160375-7474-4710-9C86-6F03A1A56F25}">
-      <dgm:prSet/>
-      <dgm:spPr/>
-      <dgm:t>
-        <a:bodyPr/>
-        <a:lstStyle/>
-        <a:p>
-          <a:endParaRPr lang="en-US"/>
-        </a:p>
-      </dgm:t>
-    </dgm:pt>
-    <dgm:pt modelId="{6E464827-4E7E-4412-BADB-B4EFD5C1F713}" type="sibTrans" cxnId="{BA160375-7474-4710-9C86-6F03A1A56F25}">
-      <dgm:prSet/>
-      <dgm:spPr/>
-      <dgm:t>
-        <a:bodyPr/>
-        <a:lstStyle/>
-        <a:p>
-          <a:endParaRPr lang="en-US"/>
-        </a:p>
-      </dgm:t>
-    </dgm:pt>
-    <dgm:pt modelId="{0F1C13EF-5C97-4FA5-B577-71ED19FD0CA0}">
-      <dgm:prSet phldrT="[Text]"/>
-      <dgm:spPr/>
-      <dgm:t>
-        <a:bodyPr/>
-        <a:lstStyle/>
-        <a:p>
-          <a:r>
-            <a:rPr lang="en-US" dirty="0"/>
-            <a:t>Trained to predict frame given previous 9 frames as input</a:t>
-          </a:r>
-        </a:p>
-      </dgm:t>
-    </dgm:pt>
-    <dgm:pt modelId="{EE79622F-9C66-4D67-8B1B-F1B42FC32B3A}" type="parTrans" cxnId="{A666ADF7-013E-491A-BC0E-504B504F01B1}">
-      <dgm:prSet/>
-      <dgm:spPr/>
-      <dgm:t>
-        <a:bodyPr/>
-        <a:lstStyle/>
-        <a:p>
-          <a:endParaRPr lang="en-US"/>
-        </a:p>
-      </dgm:t>
-    </dgm:pt>
-    <dgm:pt modelId="{028F0449-1EC6-4E05-839A-82A76D249A06}" type="sibTrans" cxnId="{A666ADF7-013E-491A-BC0E-504B504F01B1}">
-      <dgm:prSet/>
-      <dgm:spPr/>
-      <dgm:t>
-        <a:bodyPr/>
-        <a:lstStyle/>
-        <a:p>
-          <a:endParaRPr lang="en-US"/>
-        </a:p>
-      </dgm:t>
-    </dgm:pt>
-    <dgm:pt modelId="{88CF0623-7AAD-480A-BBAB-6BBDE072C15F}">
-      <dgm:prSet phldrT="[Text]"/>
-      <dgm:spPr/>
-      <dgm:t>
-        <a:bodyPr/>
-        <a:lstStyle/>
-        <a:p>
-          <a:r>
-            <a:rPr lang="en-US" dirty="0"/>
-            <a:t>Train multiple models</a:t>
-          </a:r>
-        </a:p>
-      </dgm:t>
-    </dgm:pt>
-    <dgm:pt modelId="{4F61CC04-3237-4394-8224-295823FC2C3B}" type="parTrans" cxnId="{D38ECB31-900B-4E60-81B1-BFD96D2A46BF}">
-      <dgm:prSet/>
-      <dgm:spPr/>
-      <dgm:t>
-        <a:bodyPr/>
-        <a:lstStyle/>
-        <a:p>
-          <a:endParaRPr lang="en-US"/>
-        </a:p>
-      </dgm:t>
-    </dgm:pt>
-    <dgm:pt modelId="{83B5BE83-DDAD-41A6-9C69-EBD6ECFD5BB8}" type="sibTrans" cxnId="{D38ECB31-900B-4E60-81B1-BFD96D2A46BF}">
-      <dgm:prSet/>
-      <dgm:spPr/>
-      <dgm:t>
-        <a:bodyPr/>
-        <a:lstStyle/>
-        <a:p>
-          <a:endParaRPr lang="en-US"/>
-        </a:p>
-      </dgm:t>
-    </dgm:pt>
-    <dgm:pt modelId="{E6D6CFB2-F896-4DC1-8E72-68BA43959521}">
-      <dgm:prSet phldrT="[Text]"/>
-      <dgm:spPr/>
-      <dgm:t>
-        <a:bodyPr/>
-        <a:lstStyle/>
-        <a:p>
-          <a:r>
-            <a:rPr lang="en-US" dirty="0"/>
-            <a:t>Take the median prediction from the members of the ensemble</a:t>
-          </a:r>
-        </a:p>
-      </dgm:t>
-    </dgm:pt>
-    <dgm:pt modelId="{EAE3D6CB-6511-4EA6-9A39-99F1A52AF25C}" type="parTrans" cxnId="{61B5FE02-ADE5-4857-B6FB-0A64563B28D9}">
-      <dgm:prSet/>
-      <dgm:spPr/>
-      <dgm:t>
-        <a:bodyPr/>
-        <a:lstStyle/>
-        <a:p>
-          <a:endParaRPr lang="en-US"/>
-        </a:p>
-      </dgm:t>
-    </dgm:pt>
-    <dgm:pt modelId="{DDE0F5B2-002C-4500-9603-A0EF29F2CCB0}" type="sibTrans" cxnId="{61B5FE02-ADE5-4857-B6FB-0A64563B28D9}">
-      <dgm:prSet/>
-      <dgm:spPr/>
-      <dgm:t>
-        <a:bodyPr/>
-        <a:lstStyle/>
-        <a:p>
-          <a:endParaRPr lang="en-US"/>
-        </a:p>
-      </dgm:t>
-    </dgm:pt>
-    <dgm:pt modelId="{CE7300D5-3405-4495-AD7B-5F3B944E2CE0}">
-      <dgm:prSet phldrT="[Text]"/>
-      <dgm:spPr/>
-      <dgm:t>
-        <a:bodyPr/>
-        <a:lstStyle/>
-        <a:p>
-          <a:r>
-            <a:rPr lang="en-US" dirty="0"/>
-            <a:t>Imputation</a:t>
-          </a:r>
-        </a:p>
-      </dgm:t>
-    </dgm:pt>
-    <dgm:pt modelId="{97006804-CDC3-40EE-B58D-A87D20E90175}" type="parTrans" cxnId="{4DF439F1-2E2F-4F93-9779-31241054F446}">
-      <dgm:prSet/>
-      <dgm:spPr/>
-      <dgm:t>
-        <a:bodyPr/>
-        <a:lstStyle/>
-        <a:p>
-          <a:endParaRPr lang="en-US"/>
-        </a:p>
-      </dgm:t>
-    </dgm:pt>
-    <dgm:pt modelId="{A266EF83-5948-4BDF-BDCB-2ADA5B146BEA}" type="sibTrans" cxnId="{4DF439F1-2E2F-4F93-9779-31241054F446}">
-      <dgm:prSet/>
-      <dgm:spPr/>
-      <dgm:t>
-        <a:bodyPr/>
-        <a:lstStyle/>
-        <a:p>
-          <a:endParaRPr lang="en-US"/>
-        </a:p>
-      </dgm:t>
-    </dgm:pt>
-    <dgm:pt modelId="{ABC5F241-50F1-444C-9380-F5222F18DBE9}">
-      <dgm:prSet phldrT="[Text]"/>
-      <dgm:spPr/>
-      <dgm:t>
-        <a:bodyPr/>
-        <a:lstStyle/>
-        <a:p>
-          <a:r>
-            <a:rPr lang="en-US" dirty="0"/>
-            <a:t>Feed ensemble predictions back into the model to impute long sequences. </a:t>
-          </a:r>
-        </a:p>
-      </dgm:t>
-    </dgm:pt>
-    <dgm:pt modelId="{A16D44CC-E350-4722-8784-51F525538883}" type="parTrans" cxnId="{39EC0EF2-320C-4EE3-A651-875A21E856F5}">
-      <dgm:prSet/>
-      <dgm:spPr/>
-      <dgm:t>
-        <a:bodyPr/>
-        <a:lstStyle/>
-        <a:p>
-          <a:endParaRPr lang="en-US"/>
-        </a:p>
-      </dgm:t>
-    </dgm:pt>
-    <dgm:pt modelId="{D5A4E70B-7BE7-4C0C-8E09-3A6C46CA2FE7}" type="sibTrans" cxnId="{39EC0EF2-320C-4EE3-A651-875A21E856F5}">
-      <dgm:prSet/>
-      <dgm:spPr/>
-      <dgm:t>
-        <a:bodyPr/>
-        <a:lstStyle/>
-        <a:p>
-          <a:endParaRPr lang="en-US"/>
-        </a:p>
-      </dgm:t>
-    </dgm:pt>
-    <dgm:pt modelId="{005C6827-7B3A-459C-B83D-1E0F01A41328}">
-      <dgm:prSet phldrT="[Text]"/>
-      <dgm:spPr/>
-      <dgm:t>
-        <a:bodyPr/>
-        <a:lstStyle/>
-        <a:p>
-          <a:r>
-            <a:rPr lang="en-US" dirty="0"/>
-            <a:t>Impute bad frames and those for which the prediction deviates from the measured value by a distance threshold. </a:t>
-          </a:r>
-        </a:p>
-      </dgm:t>
-    </dgm:pt>
-    <dgm:pt modelId="{D8FB2680-1310-42AB-8C97-BAEF46D10359}" type="parTrans" cxnId="{E48A389C-2D2C-4358-8914-29580BF1E47C}">
-      <dgm:prSet/>
-      <dgm:spPr/>
-      <dgm:t>
-        <a:bodyPr/>
-        <a:lstStyle/>
-        <a:p>
-          <a:endParaRPr lang="en-US"/>
-        </a:p>
-      </dgm:t>
-    </dgm:pt>
-    <dgm:pt modelId="{5EE886B5-E732-4EB7-AF73-50498D78519C}" type="sibTrans" cxnId="{E48A389C-2D2C-4358-8914-29580BF1E47C}">
-      <dgm:prSet/>
-      <dgm:spPr/>
-      <dgm:t>
-        <a:bodyPr/>
-        <a:lstStyle/>
-        <a:p>
-          <a:endParaRPr lang="en-US"/>
-        </a:p>
-      </dgm:t>
-    </dgm:pt>
-    <dgm:pt modelId="{B26ED09A-719F-43D6-8E94-DAF85A6F52B9}">
-      <dgm:prSet phldrT="[Text]"/>
-      <dgm:spPr/>
-      <dgm:t>
-        <a:bodyPr/>
-        <a:lstStyle/>
-        <a:p>
-          <a:r>
-            <a:rPr lang="en-US" dirty="0"/>
-            <a:t>Postprocessing</a:t>
-          </a:r>
-        </a:p>
-      </dgm:t>
-    </dgm:pt>
-    <dgm:pt modelId="{A843B088-0F74-4562-9C42-6B5BB668E006}" type="parTrans" cxnId="{4AD38395-0F90-4684-96B9-602B92F55B29}">
-      <dgm:prSet/>
-      <dgm:spPr/>
-      <dgm:t>
-        <a:bodyPr/>
-        <a:lstStyle/>
-        <a:p>
-          <a:endParaRPr lang="en-US"/>
-        </a:p>
-      </dgm:t>
-    </dgm:pt>
-    <dgm:pt modelId="{0B586E58-AD84-4BA2-A1B2-85C4FA6987B7}" type="sibTrans" cxnId="{4AD38395-0F90-4684-96B9-602B92F55B29}">
-      <dgm:prSet/>
-      <dgm:spPr/>
-      <dgm:t>
-        <a:bodyPr/>
-        <a:lstStyle/>
-        <a:p>
-          <a:endParaRPr lang="en-US"/>
-        </a:p>
-      </dgm:t>
-    </dgm:pt>
-    <dgm:pt modelId="{5F448D62-EC35-4E2D-9A21-56929B5EEC89}">
-      <dgm:prSet phldrT="[Text]"/>
-      <dgm:spPr/>
-      <dgm:t>
-        <a:bodyPr/>
-        <a:lstStyle/>
-        <a:p>
-          <a:r>
-            <a:rPr lang="en-US" dirty="0"/>
-            <a:t>Combine forward and reverse predictions with weighted averaging. </a:t>
-          </a:r>
-        </a:p>
-      </dgm:t>
-    </dgm:pt>
-    <dgm:pt modelId="{0020BF12-BEB7-4B4E-8608-33059C3394C1}" type="parTrans" cxnId="{434C1475-64B0-4BC0-8712-48EF5D4B619A}">
-      <dgm:prSet/>
-      <dgm:spPr/>
-      <dgm:t>
-        <a:bodyPr/>
-        <a:lstStyle/>
-        <a:p>
-          <a:endParaRPr lang="en-US"/>
-        </a:p>
-      </dgm:t>
-    </dgm:pt>
-    <dgm:pt modelId="{7D3CDA7E-D816-4503-82F8-BFCE2071EAAD}" type="sibTrans" cxnId="{434C1475-64B0-4BC0-8712-48EF5D4B619A}">
-      <dgm:prSet/>
-      <dgm:spPr/>
-      <dgm:t>
-        <a:bodyPr/>
-        <a:lstStyle/>
-        <a:p>
-          <a:endParaRPr lang="en-US"/>
-        </a:p>
-      </dgm:t>
-    </dgm:pt>
-    <dgm:pt modelId="{131DD389-933B-4FAC-B3F5-90EDB770D971}">
-      <dgm:prSet phldrT="[Text]"/>
-      <dgm:spPr/>
-      <dgm:t>
-        <a:bodyPr/>
-        <a:lstStyle/>
-        <a:p>
-          <a:r>
-            <a:rPr lang="en-US" dirty="0"/>
-            <a:t>Calculate the total jerk across all markers at each frame and identify remaining bad frames using a threshold.</a:t>
-          </a:r>
-        </a:p>
-      </dgm:t>
-    </dgm:pt>
-    <dgm:pt modelId="{AA850D69-9767-4C8F-9EE4-43640EC3E61A}" type="parTrans" cxnId="{0D76AA05-DCC9-4CA6-9891-E7F244F99F70}">
-      <dgm:prSet/>
-      <dgm:spPr/>
-      <dgm:t>
-        <a:bodyPr/>
-        <a:lstStyle/>
-        <a:p>
-          <a:endParaRPr lang="en-US"/>
-        </a:p>
-      </dgm:t>
-    </dgm:pt>
-    <dgm:pt modelId="{F34ED33E-EE1C-442D-9904-0143FB6A2045}" type="sibTrans" cxnId="{0D76AA05-DCC9-4CA6-9891-E7F244F99F70}">
-      <dgm:prSet/>
-      <dgm:spPr/>
-      <dgm:t>
-        <a:bodyPr/>
-        <a:lstStyle/>
-        <a:p>
-          <a:endParaRPr lang="en-US"/>
-        </a:p>
-      </dgm:t>
-    </dgm:pt>
-    <dgm:pt modelId="{38A7E32B-DB2E-4DD4-B8E9-7502A42B8604}">
-      <dgm:prSet phldrT="[Text]"/>
-      <dgm:spPr/>
-      <dgm:t>
-        <a:bodyPr/>
-        <a:lstStyle/>
-        <a:p>
-          <a:r>
-            <a:rPr lang="en-US" dirty="0"/>
-            <a:t>Smooth the output traces with a median filter.</a:t>
-          </a:r>
-        </a:p>
-      </dgm:t>
-    </dgm:pt>
-    <dgm:pt modelId="{DAD28D7E-900C-493D-99E0-1FE83FCCC94F}" type="parTrans" cxnId="{EBE9EEA6-077D-42AD-ABCF-52C6F776A084}">
-      <dgm:prSet/>
-      <dgm:spPr/>
-      <dgm:t>
-        <a:bodyPr/>
-        <a:lstStyle/>
-        <a:p>
-          <a:endParaRPr lang="en-US"/>
-        </a:p>
-      </dgm:t>
-    </dgm:pt>
-    <dgm:pt modelId="{0776CDF9-E44B-4FC6-8ECE-A4DDC0B6EBE1}" type="sibTrans" cxnId="{EBE9EEA6-077D-42AD-ABCF-52C6F776A084}">
-      <dgm:prSet/>
-      <dgm:spPr/>
-      <dgm:t>
-        <a:bodyPr/>
-        <a:lstStyle/>
-        <a:p>
-          <a:endParaRPr lang="en-US"/>
-        </a:p>
-      </dgm:t>
-    </dgm:pt>
-    <dgm:pt modelId="{130FF5BF-E8E8-4342-9764-B4494DFED63D}" type="pres">
-      <dgm:prSet presAssocID="{D9046E42-BF76-4AED-A110-6225E534D57C}" presName="Name0" presStyleCnt="0">
-        <dgm:presLayoutVars>
-          <dgm:dir/>
-          <dgm:animLvl val="lvl"/>
-          <dgm:resizeHandles val="exact"/>
-        </dgm:presLayoutVars>
-      </dgm:prSet>
-      <dgm:spPr/>
-    </dgm:pt>
-    <dgm:pt modelId="{39E32CB2-E368-4F58-96F6-147313C55723}" type="pres">
-      <dgm:prSet presAssocID="{E851C84F-B54D-45A0-98D7-C9DBAF425177}" presName="linNode" presStyleCnt="0"/>
-      <dgm:spPr/>
-    </dgm:pt>
-    <dgm:pt modelId="{19485995-6632-4CF7-BC0B-750E735F1132}" type="pres">
-      <dgm:prSet presAssocID="{E851C84F-B54D-45A0-98D7-C9DBAF425177}" presName="parentText" presStyleLbl="node1" presStyleIdx="0" presStyleCnt="5">
-        <dgm:presLayoutVars>
-          <dgm:chMax val="1"/>
-          <dgm:bulletEnabled val="1"/>
-        </dgm:presLayoutVars>
-      </dgm:prSet>
-      <dgm:spPr/>
-    </dgm:pt>
-    <dgm:pt modelId="{6B3B311B-C66A-4020-8E62-45F0623895FC}" type="pres">
-      <dgm:prSet presAssocID="{E851C84F-B54D-45A0-98D7-C9DBAF425177}" presName="descendantText" presStyleLbl="alignAccFollowNode1" presStyleIdx="0" presStyleCnt="5">
-        <dgm:presLayoutVars>
-          <dgm:bulletEnabled val="1"/>
-        </dgm:presLayoutVars>
-      </dgm:prSet>
-      <dgm:spPr/>
-    </dgm:pt>
-    <dgm:pt modelId="{49EBCA49-2E56-4BD7-B0BC-1AF3F3728159}" type="pres">
-      <dgm:prSet presAssocID="{96AC5923-1A4B-4A13-BF87-C098C349DA8B}" presName="sp" presStyleCnt="0"/>
-      <dgm:spPr/>
-    </dgm:pt>
-    <dgm:pt modelId="{6A0CEA6D-70DA-4556-B0B9-A3EE76E3EFBB}" type="pres">
-      <dgm:prSet presAssocID="{A86FC59B-E306-4C2A-B077-CB0610CCF927}" presName="linNode" presStyleCnt="0"/>
-      <dgm:spPr/>
-    </dgm:pt>
-    <dgm:pt modelId="{2270BD97-C390-4356-8F4C-AF2F007B8E02}" type="pres">
-      <dgm:prSet presAssocID="{A86FC59B-E306-4C2A-B077-CB0610CCF927}" presName="parentText" presStyleLbl="node1" presStyleIdx="1" presStyleCnt="5">
-        <dgm:presLayoutVars>
-          <dgm:chMax val="1"/>
-          <dgm:bulletEnabled val="1"/>
-        </dgm:presLayoutVars>
-      </dgm:prSet>
-      <dgm:spPr/>
-    </dgm:pt>
-    <dgm:pt modelId="{26548BDD-1989-4A1D-99EC-9F7B1BFA5ACE}" type="pres">
-      <dgm:prSet presAssocID="{A86FC59B-E306-4C2A-B077-CB0610CCF927}" presName="descendantText" presStyleLbl="alignAccFollowNode1" presStyleIdx="1" presStyleCnt="5">
-        <dgm:presLayoutVars>
-          <dgm:bulletEnabled val="1"/>
-        </dgm:presLayoutVars>
-      </dgm:prSet>
-      <dgm:spPr/>
-    </dgm:pt>
-    <dgm:pt modelId="{8D106C81-4AB7-4891-9CE2-49EE2972149F}" type="pres">
-      <dgm:prSet presAssocID="{1C6350BC-A4BC-44A8-8B89-6E297231B725}" presName="sp" presStyleCnt="0"/>
-      <dgm:spPr/>
-    </dgm:pt>
-    <dgm:pt modelId="{B3673BAB-C318-447E-B4E1-75731FA42E10}" type="pres">
-      <dgm:prSet presAssocID="{0FB0D465-E9EF-44D4-BD3C-36C245B0B58D}" presName="linNode" presStyleCnt="0"/>
-      <dgm:spPr/>
-    </dgm:pt>
-    <dgm:pt modelId="{CBBB2B02-7B94-4763-84F4-D8FD9C244F9C}" type="pres">
-      <dgm:prSet presAssocID="{0FB0D465-E9EF-44D4-BD3C-36C245B0B58D}" presName="parentText" presStyleLbl="node1" presStyleIdx="2" presStyleCnt="5">
-        <dgm:presLayoutVars>
-          <dgm:chMax val="1"/>
-          <dgm:bulletEnabled val="1"/>
-        </dgm:presLayoutVars>
-      </dgm:prSet>
-      <dgm:spPr/>
-    </dgm:pt>
-    <dgm:pt modelId="{5CCDDB10-DA8F-44E6-8447-9B4DE91F1FFC}" type="pres">
-      <dgm:prSet presAssocID="{0FB0D465-E9EF-44D4-BD3C-36C245B0B58D}" presName="descendantText" presStyleLbl="alignAccFollowNode1" presStyleIdx="2" presStyleCnt="5">
-        <dgm:presLayoutVars>
-          <dgm:bulletEnabled val="1"/>
-        </dgm:presLayoutVars>
-      </dgm:prSet>
-      <dgm:spPr/>
-    </dgm:pt>
-    <dgm:pt modelId="{18EB4E4D-2942-4FB1-829B-BEAE5ECDA332}" type="pres">
-      <dgm:prSet presAssocID="{5D4B9573-7E8B-4332-BD3E-DCBA0AC19D02}" presName="sp" presStyleCnt="0"/>
-      <dgm:spPr/>
-    </dgm:pt>
-    <dgm:pt modelId="{8EA5A3A8-4C32-4A9B-87E9-18678511783F}" type="pres">
-      <dgm:prSet presAssocID="{CE7300D5-3405-4495-AD7B-5F3B944E2CE0}" presName="linNode" presStyleCnt="0"/>
-      <dgm:spPr/>
-    </dgm:pt>
-    <dgm:pt modelId="{7B9B3CE8-12E8-44F5-ADA0-26709FF4BADE}" type="pres">
-      <dgm:prSet presAssocID="{CE7300D5-3405-4495-AD7B-5F3B944E2CE0}" presName="parentText" presStyleLbl="node1" presStyleIdx="3" presStyleCnt="5">
-        <dgm:presLayoutVars>
-          <dgm:chMax val="1"/>
-          <dgm:bulletEnabled val="1"/>
-        </dgm:presLayoutVars>
-      </dgm:prSet>
-      <dgm:spPr/>
-    </dgm:pt>
-    <dgm:pt modelId="{6957A458-7283-4E0D-97B4-BC26DC913309}" type="pres">
-      <dgm:prSet presAssocID="{CE7300D5-3405-4495-AD7B-5F3B944E2CE0}" presName="descendantText" presStyleLbl="alignAccFollowNode1" presStyleIdx="3" presStyleCnt="5" custLinFactNeighborX="919" custLinFactNeighborY="-538">
-        <dgm:presLayoutVars>
-          <dgm:bulletEnabled val="1"/>
-        </dgm:presLayoutVars>
-      </dgm:prSet>
-      <dgm:spPr/>
-    </dgm:pt>
-    <dgm:pt modelId="{FF09A1CA-42C8-495C-AADC-C8993D7DA1AE}" type="pres">
-      <dgm:prSet presAssocID="{A266EF83-5948-4BDF-BDCB-2ADA5B146BEA}" presName="sp" presStyleCnt="0"/>
-      <dgm:spPr/>
-    </dgm:pt>
-    <dgm:pt modelId="{784A8029-0617-42D6-B417-BBA2902B65AE}" type="pres">
-      <dgm:prSet presAssocID="{B26ED09A-719F-43D6-8E94-DAF85A6F52B9}" presName="linNode" presStyleCnt="0"/>
-      <dgm:spPr/>
-    </dgm:pt>
-    <dgm:pt modelId="{573685F9-D73D-4930-95FF-D867F907944F}" type="pres">
-      <dgm:prSet presAssocID="{B26ED09A-719F-43D6-8E94-DAF85A6F52B9}" presName="parentText" presStyleLbl="node1" presStyleIdx="4" presStyleCnt="5">
-        <dgm:presLayoutVars>
-          <dgm:chMax val="1"/>
-          <dgm:bulletEnabled val="1"/>
-        </dgm:presLayoutVars>
-      </dgm:prSet>
-      <dgm:spPr/>
-    </dgm:pt>
-    <dgm:pt modelId="{3BDBEA8B-826E-4DEE-98FD-84E941F426C2}" type="pres">
-      <dgm:prSet presAssocID="{B26ED09A-719F-43D6-8E94-DAF85A6F52B9}" presName="descendantText" presStyleLbl="alignAccFollowNode1" presStyleIdx="4" presStyleCnt="5">
-        <dgm:presLayoutVars>
-          <dgm:bulletEnabled val="1"/>
-        </dgm:presLayoutVars>
-      </dgm:prSet>
-      <dgm:spPr/>
-    </dgm:pt>
-  </dgm:ptLst>
-  <dgm:cxnLst>
-    <dgm:cxn modelId="{51ADD900-80AE-44C3-971D-851DFE64253E}" type="presOf" srcId="{FF83436B-F015-4536-84B5-659641849008}" destId="{5CCDDB10-DA8F-44E6-8447-9B4DE91F1FFC}" srcOrd="0" destOrd="0" presId="urn:microsoft.com/office/officeart/2005/8/layout/vList5"/>
-    <dgm:cxn modelId="{61B5FE02-ADE5-4857-B6FB-0A64563B28D9}" srcId="{0FB0D465-E9EF-44D4-BD3C-36C245B0B58D}" destId="{E6D6CFB2-F896-4DC1-8E72-68BA43959521}" srcOrd="1" destOrd="0" parTransId="{EAE3D6CB-6511-4EA6-9A39-99F1A52AF25C}" sibTransId="{DDE0F5B2-002C-4500-9603-A0EF29F2CCB0}"/>
-    <dgm:cxn modelId="{0D76AA05-DCC9-4CA6-9891-E7F244F99F70}" srcId="{B26ED09A-719F-43D6-8E94-DAF85A6F52B9}" destId="{131DD389-933B-4FAC-B3F5-90EDB770D971}" srcOrd="0" destOrd="0" parTransId="{AA850D69-9767-4C8F-9EE4-43640EC3E61A}" sibTransId="{F34ED33E-EE1C-442D-9904-0143FB6A2045}"/>
-    <dgm:cxn modelId="{BEB51F12-BA4A-48F7-AD80-73CB23988CD7}" type="presOf" srcId="{A86FC59B-E306-4C2A-B077-CB0610CCF927}" destId="{2270BD97-C390-4356-8F4C-AF2F007B8E02}" srcOrd="0" destOrd="0" presId="urn:microsoft.com/office/officeart/2005/8/layout/vList5"/>
-    <dgm:cxn modelId="{6E860625-3830-4A91-B705-B971417EC8A6}" srcId="{0FB0D465-E9EF-44D4-BD3C-36C245B0B58D}" destId="{FF83436B-F015-4536-84B5-659641849008}" srcOrd="0" destOrd="0" parTransId="{87DEA420-E4EF-4129-976C-45430403BEDC}" sibTransId="{BD979954-B168-47B7-BB67-EC7F822E8384}"/>
-    <dgm:cxn modelId="{F1CC822E-4FD2-4B29-A3D4-3735AECD3191}" srcId="{E851C84F-B54D-45A0-98D7-C9DBAF425177}" destId="{80F839E1-03FA-4B70-81A8-83EA7C2CC0F3}" srcOrd="0" destOrd="0" parTransId="{689B7092-48EB-452C-9F63-930CBCE78914}" sibTransId="{C8696FAA-5D16-4357-95CB-7F763CD6F86A}"/>
-    <dgm:cxn modelId="{D38ECB31-900B-4E60-81B1-BFD96D2A46BF}" srcId="{A86FC59B-E306-4C2A-B077-CB0610CCF927}" destId="{88CF0623-7AAD-480A-BBAB-6BBDE072C15F}" srcOrd="2" destOrd="0" parTransId="{4F61CC04-3237-4394-8224-295823FC2C3B}" sibTransId="{83B5BE83-DDAD-41A6-9C69-EBD6ECFD5BB8}"/>
-    <dgm:cxn modelId="{2EBBD338-8ADF-46EA-9C75-CA5343DF9615}" type="presOf" srcId="{38A7E32B-DB2E-4DD4-B8E9-7502A42B8604}" destId="{3BDBEA8B-826E-4DEE-98FD-84E941F426C2}" srcOrd="0" destOrd="1" presId="urn:microsoft.com/office/officeart/2005/8/layout/vList5"/>
-    <dgm:cxn modelId="{C38AEB68-D070-4A64-B774-798DD4CA20A0}" type="presOf" srcId="{CE7300D5-3405-4495-AD7B-5F3B944E2CE0}" destId="{7B9B3CE8-12E8-44F5-ADA0-26709FF4BADE}" srcOrd="0" destOrd="0" presId="urn:microsoft.com/office/officeart/2005/8/layout/vList5"/>
-    <dgm:cxn modelId="{9CA05E69-8B21-4AC3-B222-1B1142362DAD}" type="presOf" srcId="{80F839E1-03FA-4B70-81A8-83EA7C2CC0F3}" destId="{6B3B311B-C66A-4020-8E62-45F0623895FC}" srcOrd="0" destOrd="0" presId="urn:microsoft.com/office/officeart/2005/8/layout/vList5"/>
-    <dgm:cxn modelId="{4B21096A-8602-4A0D-95FE-59B3D4481081}" type="presOf" srcId="{E6D6CFB2-F896-4DC1-8E72-68BA43959521}" destId="{5CCDDB10-DA8F-44E6-8447-9B4DE91F1FFC}" srcOrd="0" destOrd="1" presId="urn:microsoft.com/office/officeart/2005/8/layout/vList5"/>
-    <dgm:cxn modelId="{13AE3E6B-0CFE-4844-AF98-40366CCFC6A1}" type="presOf" srcId="{2517FFFC-88AC-49A8-9078-E583813430E3}" destId="{26548BDD-1989-4A1D-99EC-9F7B1BFA5ACE}" srcOrd="0" destOrd="0" presId="urn:microsoft.com/office/officeart/2005/8/layout/vList5"/>
-    <dgm:cxn modelId="{BA160375-7474-4710-9C86-6F03A1A56F25}" srcId="{E851C84F-B54D-45A0-98D7-C9DBAF425177}" destId="{2FF53976-15B8-4292-AFAE-3197CC9E7855}" srcOrd="1" destOrd="0" parTransId="{C6EC0163-5723-450E-887B-8852FAF8A712}" sibTransId="{6E464827-4E7E-4412-BADB-B4EFD5C1F713}"/>
-    <dgm:cxn modelId="{434C1475-64B0-4BC0-8712-48EF5D4B619A}" srcId="{CE7300D5-3405-4495-AD7B-5F3B944E2CE0}" destId="{5F448D62-EC35-4E2D-9A21-56929B5EEC89}" srcOrd="2" destOrd="0" parTransId="{0020BF12-BEB7-4B4E-8608-33059C3394C1}" sibTransId="{7D3CDA7E-D816-4503-82F8-BFCE2071EAAD}"/>
-    <dgm:cxn modelId="{16B1BE59-3A31-4B67-9FBE-A7CBF1C44A1C}" srcId="{D9046E42-BF76-4AED-A110-6225E534D57C}" destId="{A86FC59B-E306-4C2A-B077-CB0610CCF927}" srcOrd="1" destOrd="0" parTransId="{22E52C0E-9815-4689-B3CB-2B9497FE8772}" sibTransId="{1C6350BC-A4BC-44A8-8B89-6E297231B725}"/>
-    <dgm:cxn modelId="{89F3CD59-27BF-45E9-AE22-063CA348F88A}" type="presOf" srcId="{2FF53976-15B8-4292-AFAE-3197CC9E7855}" destId="{6B3B311B-C66A-4020-8E62-45F0623895FC}" srcOrd="0" destOrd="1" presId="urn:microsoft.com/office/officeart/2005/8/layout/vList5"/>
-    <dgm:cxn modelId="{62A6F65A-885E-42DE-B1E8-6D514A15B308}" srcId="{A86FC59B-E306-4C2A-B077-CB0610CCF927}" destId="{2517FFFC-88AC-49A8-9078-E583813430E3}" srcOrd="0" destOrd="0" parTransId="{EC3FBB2A-E425-4F7A-8943-A7D5D7ED9D66}" sibTransId="{C10EF163-A933-40C6-B9FF-8B156BF7B7C1}"/>
-    <dgm:cxn modelId="{FF716D89-088C-4B37-AA00-F2DAAB137CB0}" type="presOf" srcId="{ABC5F241-50F1-444C-9380-F5222F18DBE9}" destId="{6957A458-7283-4E0D-97B4-BC26DC913309}" srcOrd="0" destOrd="0" presId="urn:microsoft.com/office/officeart/2005/8/layout/vList5"/>
-    <dgm:cxn modelId="{F33FCD8A-B785-4647-8350-40BE43FBC681}" type="presOf" srcId="{0FB0D465-E9EF-44D4-BD3C-36C245B0B58D}" destId="{CBBB2B02-7B94-4763-84F4-D8FD9C244F9C}" srcOrd="0" destOrd="0" presId="urn:microsoft.com/office/officeart/2005/8/layout/vList5"/>
-    <dgm:cxn modelId="{33DDCE8E-A542-443E-893A-7E95B5B0BC9F}" srcId="{D9046E42-BF76-4AED-A110-6225E534D57C}" destId="{0FB0D465-E9EF-44D4-BD3C-36C245B0B58D}" srcOrd="2" destOrd="0" parTransId="{9E61BD83-9A13-4E81-A5B4-9F32CC54E61C}" sibTransId="{5D4B9573-7E8B-4332-BD3E-DCBA0AC19D02}"/>
-    <dgm:cxn modelId="{73ADC38F-F4B2-4565-AC6E-C5F2159E6419}" type="presOf" srcId="{0F1C13EF-5C97-4FA5-B577-71ED19FD0CA0}" destId="{26548BDD-1989-4A1D-99EC-9F7B1BFA5ACE}" srcOrd="0" destOrd="1" presId="urn:microsoft.com/office/officeart/2005/8/layout/vList5"/>
-    <dgm:cxn modelId="{92C72E90-9028-4187-A39C-B7E1FF18B10A}" type="presOf" srcId="{88CF0623-7AAD-480A-BBAB-6BBDE072C15F}" destId="{26548BDD-1989-4A1D-99EC-9F7B1BFA5ACE}" srcOrd="0" destOrd="2" presId="urn:microsoft.com/office/officeart/2005/8/layout/vList5"/>
-    <dgm:cxn modelId="{4AD38395-0F90-4684-96B9-602B92F55B29}" srcId="{D9046E42-BF76-4AED-A110-6225E534D57C}" destId="{B26ED09A-719F-43D6-8E94-DAF85A6F52B9}" srcOrd="4" destOrd="0" parTransId="{A843B088-0F74-4562-9C42-6B5BB668E006}" sibTransId="{0B586E58-AD84-4BA2-A1B2-85C4FA6987B7}"/>
-    <dgm:cxn modelId="{E48A389C-2D2C-4358-8914-29580BF1E47C}" srcId="{CE7300D5-3405-4495-AD7B-5F3B944E2CE0}" destId="{005C6827-7B3A-459C-B83D-1E0F01A41328}" srcOrd="1" destOrd="0" parTransId="{D8FB2680-1310-42AB-8C97-BAEF46D10359}" sibTransId="{5EE886B5-E732-4EB7-AF73-50498D78519C}"/>
-    <dgm:cxn modelId="{03C46CA3-9A16-49CA-857F-C3A22ABAF1BD}" type="presOf" srcId="{E851C84F-B54D-45A0-98D7-C9DBAF425177}" destId="{19485995-6632-4CF7-BC0B-750E735F1132}" srcOrd="0" destOrd="0" presId="urn:microsoft.com/office/officeart/2005/8/layout/vList5"/>
-    <dgm:cxn modelId="{EBE9EEA6-077D-42AD-ABCF-52C6F776A084}" srcId="{B26ED09A-719F-43D6-8E94-DAF85A6F52B9}" destId="{38A7E32B-DB2E-4DD4-B8E9-7502A42B8604}" srcOrd="1" destOrd="0" parTransId="{DAD28D7E-900C-493D-99E0-1FE83FCCC94F}" sibTransId="{0776CDF9-E44B-4FC6-8ECE-A4DDC0B6EBE1}"/>
-    <dgm:cxn modelId="{AAFF56A9-E10C-4F39-A53D-0C7DBC8B1AD4}" srcId="{D9046E42-BF76-4AED-A110-6225E534D57C}" destId="{E851C84F-B54D-45A0-98D7-C9DBAF425177}" srcOrd="0" destOrd="0" parTransId="{C2B5E7EB-5CD5-4C5B-88FD-4B07FCC3E98F}" sibTransId="{96AC5923-1A4B-4A13-BF87-C098C349DA8B}"/>
-    <dgm:cxn modelId="{E0C733BB-1CB9-4B2A-938B-845D3DF7AC94}" type="presOf" srcId="{131DD389-933B-4FAC-B3F5-90EDB770D971}" destId="{3BDBEA8B-826E-4DEE-98FD-84E941F426C2}" srcOrd="0" destOrd="0" presId="urn:microsoft.com/office/officeart/2005/8/layout/vList5"/>
-    <dgm:cxn modelId="{1E1D7CC5-4E4D-4169-AA7F-BCECD33DE623}" type="presOf" srcId="{005C6827-7B3A-459C-B83D-1E0F01A41328}" destId="{6957A458-7283-4E0D-97B4-BC26DC913309}" srcOrd="0" destOrd="1" presId="urn:microsoft.com/office/officeart/2005/8/layout/vList5"/>
-    <dgm:cxn modelId="{7A424FCB-80DA-4065-9BCA-AB720A1A5EB7}" type="presOf" srcId="{D9046E42-BF76-4AED-A110-6225E534D57C}" destId="{130FF5BF-E8E8-4342-9764-B4494DFED63D}" srcOrd="0" destOrd="0" presId="urn:microsoft.com/office/officeart/2005/8/layout/vList5"/>
-    <dgm:cxn modelId="{E32987DD-6803-4DEE-AF6E-244A03F0E7E9}" type="presOf" srcId="{B26ED09A-719F-43D6-8E94-DAF85A6F52B9}" destId="{573685F9-D73D-4930-95FF-D867F907944F}" srcOrd="0" destOrd="0" presId="urn:microsoft.com/office/officeart/2005/8/layout/vList5"/>
-    <dgm:cxn modelId="{C23BAFE5-D36C-4E9A-8A5F-DE46ACD33721}" type="presOf" srcId="{5F448D62-EC35-4E2D-9A21-56929B5EEC89}" destId="{6957A458-7283-4E0D-97B4-BC26DC913309}" srcOrd="0" destOrd="2" presId="urn:microsoft.com/office/officeart/2005/8/layout/vList5"/>
-    <dgm:cxn modelId="{4DF439F1-2E2F-4F93-9779-31241054F446}" srcId="{D9046E42-BF76-4AED-A110-6225E534D57C}" destId="{CE7300D5-3405-4495-AD7B-5F3B944E2CE0}" srcOrd="3" destOrd="0" parTransId="{97006804-CDC3-40EE-B58D-A87D20E90175}" sibTransId="{A266EF83-5948-4BDF-BDCB-2ADA5B146BEA}"/>
-    <dgm:cxn modelId="{39EC0EF2-320C-4EE3-A651-875A21E856F5}" srcId="{CE7300D5-3405-4495-AD7B-5F3B944E2CE0}" destId="{ABC5F241-50F1-444C-9380-F5222F18DBE9}" srcOrd="0" destOrd="0" parTransId="{A16D44CC-E350-4722-8784-51F525538883}" sibTransId="{D5A4E70B-7BE7-4C0C-8E09-3A6C46CA2FE7}"/>
-    <dgm:cxn modelId="{A666ADF7-013E-491A-BC0E-504B504F01B1}" srcId="{A86FC59B-E306-4C2A-B077-CB0610CCF927}" destId="{0F1C13EF-5C97-4FA5-B577-71ED19FD0CA0}" srcOrd="1" destOrd="0" parTransId="{EE79622F-9C66-4D67-8B1B-F1B42FC32B3A}" sibTransId="{028F0449-1EC6-4E05-839A-82A76D249A06}"/>
-    <dgm:cxn modelId="{75C8C565-CBD0-4294-BA74-EF64BB0D636F}" type="presParOf" srcId="{130FF5BF-E8E8-4342-9764-B4494DFED63D}" destId="{39E32CB2-E368-4F58-96F6-147313C55723}" srcOrd="0" destOrd="0" presId="urn:microsoft.com/office/officeart/2005/8/layout/vList5"/>
-    <dgm:cxn modelId="{24AF6C63-8A59-4382-93DA-8D5941890907}" type="presParOf" srcId="{39E32CB2-E368-4F58-96F6-147313C55723}" destId="{19485995-6632-4CF7-BC0B-750E735F1132}" srcOrd="0" destOrd="0" presId="urn:microsoft.com/office/officeart/2005/8/layout/vList5"/>
-    <dgm:cxn modelId="{2D59FC81-8AFE-4854-968A-49B4E03A7BDF}" type="presParOf" srcId="{39E32CB2-E368-4F58-96F6-147313C55723}" destId="{6B3B311B-C66A-4020-8E62-45F0623895FC}" srcOrd="1" destOrd="0" presId="urn:microsoft.com/office/officeart/2005/8/layout/vList5"/>
-    <dgm:cxn modelId="{E886662F-BECC-405C-A85C-EAAB4B8BC33C}" type="presParOf" srcId="{130FF5BF-E8E8-4342-9764-B4494DFED63D}" destId="{49EBCA49-2E56-4BD7-B0BC-1AF3F3728159}" srcOrd="1" destOrd="0" presId="urn:microsoft.com/office/officeart/2005/8/layout/vList5"/>
-    <dgm:cxn modelId="{B27572F8-D094-4D35-BC46-905A3E78AF62}" type="presParOf" srcId="{130FF5BF-E8E8-4342-9764-B4494DFED63D}" destId="{6A0CEA6D-70DA-4556-B0B9-A3EE76E3EFBB}" srcOrd="2" destOrd="0" presId="urn:microsoft.com/office/officeart/2005/8/layout/vList5"/>
-    <dgm:cxn modelId="{DB925D3E-AE24-4111-B596-6604040293F4}" type="presParOf" srcId="{6A0CEA6D-70DA-4556-B0B9-A3EE76E3EFBB}" destId="{2270BD97-C390-4356-8F4C-AF2F007B8E02}" srcOrd="0" destOrd="0" presId="urn:microsoft.com/office/officeart/2005/8/layout/vList5"/>
-    <dgm:cxn modelId="{23841598-3321-4B16-8344-FC7F4590C5E5}" type="presParOf" srcId="{6A0CEA6D-70DA-4556-B0B9-A3EE76E3EFBB}" destId="{26548BDD-1989-4A1D-99EC-9F7B1BFA5ACE}" srcOrd="1" destOrd="0" presId="urn:microsoft.com/office/officeart/2005/8/layout/vList5"/>
-    <dgm:cxn modelId="{A162F49A-AC7F-4573-BD41-C03EF81DB789}" type="presParOf" srcId="{130FF5BF-E8E8-4342-9764-B4494DFED63D}" destId="{8D106C81-4AB7-4891-9CE2-49EE2972149F}" srcOrd="3" destOrd="0" presId="urn:microsoft.com/office/officeart/2005/8/layout/vList5"/>
-    <dgm:cxn modelId="{8E4134C5-48C5-4087-BDEF-2585AE7EC133}" type="presParOf" srcId="{130FF5BF-E8E8-4342-9764-B4494DFED63D}" destId="{B3673BAB-C318-447E-B4E1-75731FA42E10}" srcOrd="4" destOrd="0" presId="urn:microsoft.com/office/officeart/2005/8/layout/vList5"/>
-    <dgm:cxn modelId="{2179EBE7-0BE1-42C2-86A5-1AF2848F17AC}" type="presParOf" srcId="{B3673BAB-C318-447E-B4E1-75731FA42E10}" destId="{CBBB2B02-7B94-4763-84F4-D8FD9C244F9C}" srcOrd="0" destOrd="0" presId="urn:microsoft.com/office/officeart/2005/8/layout/vList5"/>
-    <dgm:cxn modelId="{47C1DF57-830D-4707-841D-7996B5764369}" type="presParOf" srcId="{B3673BAB-C318-447E-B4E1-75731FA42E10}" destId="{5CCDDB10-DA8F-44E6-8447-9B4DE91F1FFC}" srcOrd="1" destOrd="0" presId="urn:microsoft.com/office/officeart/2005/8/layout/vList5"/>
-    <dgm:cxn modelId="{36C16028-E1B5-4257-A57B-F1C5B366F055}" type="presParOf" srcId="{130FF5BF-E8E8-4342-9764-B4494DFED63D}" destId="{18EB4E4D-2942-4FB1-829B-BEAE5ECDA332}" srcOrd="5" destOrd="0" presId="urn:microsoft.com/office/officeart/2005/8/layout/vList5"/>
-    <dgm:cxn modelId="{12F79F31-505C-478F-8B6A-B3B18F4E6F8D}" type="presParOf" srcId="{130FF5BF-E8E8-4342-9764-B4494DFED63D}" destId="{8EA5A3A8-4C32-4A9B-87E9-18678511783F}" srcOrd="6" destOrd="0" presId="urn:microsoft.com/office/officeart/2005/8/layout/vList5"/>
-    <dgm:cxn modelId="{2D0DF4AB-E8EF-44A4-A625-5566DADB2083}" type="presParOf" srcId="{8EA5A3A8-4C32-4A9B-87E9-18678511783F}" destId="{7B9B3CE8-12E8-44F5-ADA0-26709FF4BADE}" srcOrd="0" destOrd="0" presId="urn:microsoft.com/office/officeart/2005/8/layout/vList5"/>
-    <dgm:cxn modelId="{83EE48BD-7B5B-499F-8817-E3E151D2861B}" type="presParOf" srcId="{8EA5A3A8-4C32-4A9B-87E9-18678511783F}" destId="{6957A458-7283-4E0D-97B4-BC26DC913309}" srcOrd="1" destOrd="0" presId="urn:microsoft.com/office/officeart/2005/8/layout/vList5"/>
-    <dgm:cxn modelId="{7D29B580-2CB6-4E52-8208-8C819E1FB34C}" type="presParOf" srcId="{130FF5BF-E8E8-4342-9764-B4494DFED63D}" destId="{FF09A1CA-42C8-495C-AADC-C8993D7DA1AE}" srcOrd="7" destOrd="0" presId="urn:microsoft.com/office/officeart/2005/8/layout/vList5"/>
-    <dgm:cxn modelId="{A0175F53-7705-490F-B8E8-FDB0EF5B1BCC}" type="presParOf" srcId="{130FF5BF-E8E8-4342-9764-B4494DFED63D}" destId="{784A8029-0617-42D6-B417-BBA2902B65AE}" srcOrd="8" destOrd="0" presId="urn:microsoft.com/office/officeart/2005/8/layout/vList5"/>
-    <dgm:cxn modelId="{8BAB165D-74F5-4FD6-BD2A-9E2FB297C2F7}" type="presParOf" srcId="{784A8029-0617-42D6-B417-BBA2902B65AE}" destId="{573685F9-D73D-4930-95FF-D867F907944F}" srcOrd="0" destOrd="0" presId="urn:microsoft.com/office/officeart/2005/8/layout/vList5"/>
-    <dgm:cxn modelId="{29D7E797-00C8-4A6A-A08E-1FB001539992}" type="presParOf" srcId="{784A8029-0617-42D6-B417-BBA2902B65AE}" destId="{3BDBEA8B-826E-4DEE-98FD-84E941F426C2}" srcOrd="1" destOrd="0" presId="urn:microsoft.com/office/officeart/2005/8/layout/vList5"/>
-  </dgm:cxnLst>
-  <dgm:bg/>
-  <dgm:whole/>
-  <dgm:extLst>
-    <a:ext uri="http://schemas.microsoft.com/office/drawing/2008/diagram">
-      <dsp:dataModelExt xmlns:dsp="http://schemas.microsoft.com/office/drawing/2008/diagram" relId="rId6" minVer="http://schemas.openxmlformats.org/drawingml/2006/diagram"/>
-    </a:ext>
-  </dgm:extLst>
-</dgm:dataModel>
 </file>
 
 <file path=ppt/diagrams/drawing1.xml><?xml version="1.0" encoding="utf-8"?>
@@ -4746,281 +3804,6 @@
 </p:sldLayout>
 </file>
 
-<file path=ppt/slideLayouts/slideLayout3.xml><?xml version="1.0" encoding="utf-8"?>
-<p:sldLayout xmlns:a="http://schemas.openxmlformats.org/drawingml/2006/main" xmlns:r="http://schemas.openxmlformats.org/officeDocument/2006/relationships" xmlns:p="http://schemas.openxmlformats.org/presentationml/2006/main" type="secHead" preserve="1">
-  <p:cSld name="Section Header">
-    <p:spTree>
-      <p:nvGrpSpPr>
-        <p:cNvPr id="1" name=""/>
-        <p:cNvGrpSpPr/>
-        <p:nvPr/>
-      </p:nvGrpSpPr>
-      <p:grpSpPr>
-        <a:xfrm>
-          <a:off x="0" y="0"/>
-          <a:ext cx="0" cy="0"/>
-          <a:chOff x="0" y="0"/>
-          <a:chExt cx="0" cy="0"/>
-        </a:xfrm>
-      </p:grpSpPr>
-      <p:sp>
-        <p:nvSpPr>
-          <p:cNvPr id="2" name="Title 1">
-            <a:extLst>
-              <a:ext uri="{FF2B5EF4-FFF2-40B4-BE49-F238E27FC236}">
-                <a16:creationId xmlns:a16="http://schemas.microsoft.com/office/drawing/2014/main" id="{E61EB7BE-58E9-402C-8BD2-9AA85BF34450}"/>
-              </a:ext>
-            </a:extLst>
-          </p:cNvPr>
-          <p:cNvSpPr>
-            <a:spLocks noGrp="1"/>
-          </p:cNvSpPr>
-          <p:nvPr>
-            <p:ph type="title"/>
-          </p:nvPr>
-        </p:nvSpPr>
-        <p:spPr>
-          <a:xfrm>
-            <a:off x="831850" y="1709738"/>
-            <a:ext cx="10515600" cy="2852737"/>
-          </a:xfrm>
-        </p:spPr>
-        <p:txBody>
-          <a:bodyPr anchor="b"/>
-          <a:lstStyle>
-            <a:lvl1pPr>
-              <a:defRPr sz="6000"/>
-            </a:lvl1pPr>
-          </a:lstStyle>
-          <a:p>
-            <a:r>
-              <a:rPr lang="en-US"/>
-              <a:t>Click to edit Master title style</a:t>
-            </a:r>
-          </a:p>
-        </p:txBody>
-      </p:sp>
-      <p:sp>
-        <p:nvSpPr>
-          <p:cNvPr id="3" name="Text Placeholder 2">
-            <a:extLst>
-              <a:ext uri="{FF2B5EF4-FFF2-40B4-BE49-F238E27FC236}">
-                <a16:creationId xmlns:a16="http://schemas.microsoft.com/office/drawing/2014/main" id="{3857EFDE-FB02-491A-90D1-08F84249B5C0}"/>
-              </a:ext>
-            </a:extLst>
-          </p:cNvPr>
-          <p:cNvSpPr>
-            <a:spLocks noGrp="1"/>
-          </p:cNvSpPr>
-          <p:nvPr>
-            <p:ph type="body" idx="1"/>
-          </p:nvPr>
-        </p:nvSpPr>
-        <p:spPr>
-          <a:xfrm>
-            <a:off x="831850" y="4589463"/>
-            <a:ext cx="10515600" cy="1500187"/>
-          </a:xfrm>
-        </p:spPr>
-        <p:txBody>
-          <a:bodyPr/>
-          <a:lstStyle>
-            <a:lvl1pPr marL="0" indent="0">
-              <a:buNone/>
-              <a:defRPr sz="2400">
-                <a:solidFill>
-                  <a:schemeClr val="tx1">
-                    <a:tint val="75000"/>
-                  </a:schemeClr>
-                </a:solidFill>
-              </a:defRPr>
-            </a:lvl1pPr>
-            <a:lvl2pPr marL="457200" indent="0">
-              <a:buNone/>
-              <a:defRPr sz="2000">
-                <a:solidFill>
-                  <a:schemeClr val="tx1">
-                    <a:tint val="75000"/>
-                  </a:schemeClr>
-                </a:solidFill>
-              </a:defRPr>
-            </a:lvl2pPr>
-            <a:lvl3pPr marL="914400" indent="0">
-              <a:buNone/>
-              <a:defRPr sz="1800">
-                <a:solidFill>
-                  <a:schemeClr val="tx1">
-                    <a:tint val="75000"/>
-                  </a:schemeClr>
-                </a:solidFill>
-              </a:defRPr>
-            </a:lvl3pPr>
-            <a:lvl4pPr marL="1371600" indent="0">
-              <a:buNone/>
-              <a:defRPr sz="1600">
-                <a:solidFill>
-                  <a:schemeClr val="tx1">
-                    <a:tint val="75000"/>
-                  </a:schemeClr>
-                </a:solidFill>
-              </a:defRPr>
-            </a:lvl4pPr>
-            <a:lvl5pPr marL="1828800" indent="0">
-              <a:buNone/>
-              <a:defRPr sz="1600">
-                <a:solidFill>
-                  <a:schemeClr val="tx1">
-                    <a:tint val="75000"/>
-                  </a:schemeClr>
-                </a:solidFill>
-              </a:defRPr>
-            </a:lvl5pPr>
-            <a:lvl6pPr marL="2286000" indent="0">
-              <a:buNone/>
-              <a:defRPr sz="1600">
-                <a:solidFill>
-                  <a:schemeClr val="tx1">
-                    <a:tint val="75000"/>
-                  </a:schemeClr>
-                </a:solidFill>
-              </a:defRPr>
-            </a:lvl6pPr>
-            <a:lvl7pPr marL="2743200" indent="0">
-              <a:buNone/>
-              <a:defRPr sz="1600">
-                <a:solidFill>
-                  <a:schemeClr val="tx1">
-                    <a:tint val="75000"/>
-                  </a:schemeClr>
-                </a:solidFill>
-              </a:defRPr>
-            </a:lvl7pPr>
-            <a:lvl8pPr marL="3200400" indent="0">
-              <a:buNone/>
-              <a:defRPr sz="1600">
-                <a:solidFill>
-                  <a:schemeClr val="tx1">
-                    <a:tint val="75000"/>
-                  </a:schemeClr>
-                </a:solidFill>
-              </a:defRPr>
-            </a:lvl8pPr>
-            <a:lvl9pPr marL="3657600" indent="0">
-              <a:buNone/>
-              <a:defRPr sz="1600">
-                <a:solidFill>
-                  <a:schemeClr val="tx1">
-                    <a:tint val="75000"/>
-                  </a:schemeClr>
-                </a:solidFill>
-              </a:defRPr>
-            </a:lvl9pPr>
-          </a:lstStyle>
-          <a:p>
-            <a:pPr lvl="0"/>
-            <a:r>
-              <a:rPr lang="en-US"/>
-              <a:t>Edit Master text styles</a:t>
-            </a:r>
-          </a:p>
-        </p:txBody>
-      </p:sp>
-      <p:sp>
-        <p:nvSpPr>
-          <p:cNvPr id="4" name="Date Placeholder 3">
-            <a:extLst>
-              <a:ext uri="{FF2B5EF4-FFF2-40B4-BE49-F238E27FC236}">
-                <a16:creationId xmlns:a16="http://schemas.microsoft.com/office/drawing/2014/main" id="{35D304D8-E760-4DA0-8012-8311B937E3D2}"/>
-              </a:ext>
-            </a:extLst>
-          </p:cNvPr>
-          <p:cNvSpPr>
-            <a:spLocks noGrp="1"/>
-          </p:cNvSpPr>
-          <p:nvPr>
-            <p:ph type="dt" sz="half" idx="10"/>
-          </p:nvPr>
-        </p:nvSpPr>
-        <p:spPr/>
-        <p:txBody>
-          <a:bodyPr/>
-          <a:lstStyle/>
-          <a:p>
-            <a:fld id="{455227EA-F02B-4D7E-B40B-53F8684A6DEC}" type="datetimeFigureOut">
-              <a:rPr lang="en-US" smtClean="0"/>
-              <a:t>12/17/2018</a:t>
-            </a:fld>
-            <a:endParaRPr lang="en-US"/>
-          </a:p>
-        </p:txBody>
-      </p:sp>
-      <p:sp>
-        <p:nvSpPr>
-          <p:cNvPr id="5" name="Footer Placeholder 4">
-            <a:extLst>
-              <a:ext uri="{FF2B5EF4-FFF2-40B4-BE49-F238E27FC236}">
-                <a16:creationId xmlns:a16="http://schemas.microsoft.com/office/drawing/2014/main" id="{B9925809-982B-49AB-9496-AD3B90017098}"/>
-              </a:ext>
-            </a:extLst>
-          </p:cNvPr>
-          <p:cNvSpPr>
-            <a:spLocks noGrp="1"/>
-          </p:cNvSpPr>
-          <p:nvPr>
-            <p:ph type="ftr" sz="quarter" idx="11"/>
-          </p:nvPr>
-        </p:nvSpPr>
-        <p:spPr/>
-        <p:txBody>
-          <a:bodyPr/>
-          <a:lstStyle/>
-          <a:p>
-            <a:endParaRPr lang="en-US"/>
-          </a:p>
-        </p:txBody>
-      </p:sp>
-      <p:sp>
-        <p:nvSpPr>
-          <p:cNvPr id="6" name="Slide Number Placeholder 5">
-            <a:extLst>
-              <a:ext uri="{FF2B5EF4-FFF2-40B4-BE49-F238E27FC236}">
-                <a16:creationId xmlns:a16="http://schemas.microsoft.com/office/drawing/2014/main" id="{25FD604D-EA53-4E94-B0E0-F58742E34CA0}"/>
-              </a:ext>
-            </a:extLst>
-          </p:cNvPr>
-          <p:cNvSpPr>
-            <a:spLocks noGrp="1"/>
-          </p:cNvSpPr>
-          <p:nvPr>
-            <p:ph type="sldNum" sz="quarter" idx="12"/>
-          </p:nvPr>
-        </p:nvSpPr>
-        <p:spPr/>
-        <p:txBody>
-          <a:bodyPr/>
-          <a:lstStyle/>
-          <a:p>
-            <a:fld id="{946EE452-F5FC-468E-B1D8-5E642B6AA444}" type="slidenum">
-              <a:rPr lang="en-US" smtClean="0"/>
-              <a:t>‹#›</a:t>
-            </a:fld>
-            <a:endParaRPr lang="en-US"/>
-          </a:p>
-        </p:txBody>
-      </p:sp>
-    </p:spTree>
-    <p:extLst>
-      <p:ext uri="{BB962C8B-B14F-4D97-AF65-F5344CB8AC3E}">
-        <p14:creationId xmlns:p14="http://schemas.microsoft.com/office/powerpoint/2010/main" val="1391741686"/>
-      </p:ext>
-    </p:extLst>
-  </p:cSld>
-  <p:clrMapOvr>
-    <a:masterClrMapping/>
-  </p:clrMapOvr>
-</p:sldLayout>
-</file>
-
 <file path=ppt/slideLayouts/slideLayout4.xml><?xml version="1.0" encoding="utf-8"?>
 <p:sldLayout xmlns:a="http://schemas.openxmlformats.org/drawingml/2006/main" xmlns:r="http://schemas.openxmlformats.org/officeDocument/2006/relationships" xmlns:p="http://schemas.openxmlformats.org/presentationml/2006/main" type="twoObj" preserve="1">
   <p:cSld name="Two Content">
@@ -6549,2378 +5332,6 @@
     <a:masterClrMapping/>
   </p:clrMapOvr>
 </p:sldLayout>
-</file>
-
-<file path=ppt/slideMasters/slideMaster1.xml><?xml version="1.0" encoding="utf-8"?>
-<p:sldMaster xmlns:a="http://schemas.openxmlformats.org/drawingml/2006/main" xmlns:r="http://schemas.openxmlformats.org/officeDocument/2006/relationships" xmlns:p="http://schemas.openxmlformats.org/presentationml/2006/main">
-  <p:cSld>
-    <p:bg>
-      <p:bgRef idx="1001">
-        <a:schemeClr val="bg1"/>
-      </p:bgRef>
-    </p:bg>
-    <p:spTree>
-      <p:nvGrpSpPr>
-        <p:cNvPr id="1" name=""/>
-        <p:cNvGrpSpPr/>
-        <p:nvPr/>
-      </p:nvGrpSpPr>
-      <p:grpSpPr>
-        <a:xfrm>
-          <a:off x="0" y="0"/>
-          <a:ext cx="0" cy="0"/>
-          <a:chOff x="0" y="0"/>
-          <a:chExt cx="0" cy="0"/>
-        </a:xfrm>
-      </p:grpSpPr>
-      <p:sp>
-        <p:nvSpPr>
-          <p:cNvPr id="2" name="Title Placeholder 1">
-            <a:extLst>
-              <a:ext uri="{FF2B5EF4-FFF2-40B4-BE49-F238E27FC236}">
-                <a16:creationId xmlns:a16="http://schemas.microsoft.com/office/drawing/2014/main" id="{FA68897F-E1DC-4240-8ABC-88212971137B}"/>
-              </a:ext>
-            </a:extLst>
-          </p:cNvPr>
-          <p:cNvSpPr>
-            <a:spLocks noGrp="1"/>
-          </p:cNvSpPr>
-          <p:nvPr>
-            <p:ph type="title"/>
-          </p:nvPr>
-        </p:nvSpPr>
-        <p:spPr>
-          <a:xfrm>
-            <a:off x="838200" y="365125"/>
-            <a:ext cx="10515600" cy="1325563"/>
-          </a:xfrm>
-          <a:prstGeom prst="rect">
-            <a:avLst/>
-          </a:prstGeom>
-        </p:spPr>
-        <p:txBody>
-          <a:bodyPr vert="horz" lIns="91440" tIns="45720" rIns="91440" bIns="45720" rtlCol="0" anchor="ctr">
-            <a:normAutofit/>
-          </a:bodyPr>
-          <a:lstStyle/>
-          <a:p>
-            <a:r>
-              <a:rPr lang="en-US"/>
-              <a:t>Click to edit Master title style</a:t>
-            </a:r>
-          </a:p>
-        </p:txBody>
-      </p:sp>
-      <p:sp>
-        <p:nvSpPr>
-          <p:cNvPr id="3" name="Text Placeholder 2">
-            <a:extLst>
-              <a:ext uri="{FF2B5EF4-FFF2-40B4-BE49-F238E27FC236}">
-                <a16:creationId xmlns:a16="http://schemas.microsoft.com/office/drawing/2014/main" id="{477AE038-4464-4EDB-BEA9-6CD0293F6968}"/>
-              </a:ext>
-            </a:extLst>
-          </p:cNvPr>
-          <p:cNvSpPr>
-            <a:spLocks noGrp="1"/>
-          </p:cNvSpPr>
-          <p:nvPr>
-            <p:ph type="body" idx="1"/>
-          </p:nvPr>
-        </p:nvSpPr>
-        <p:spPr>
-          <a:xfrm>
-            <a:off x="838200" y="1825625"/>
-            <a:ext cx="10515600" cy="4351338"/>
-          </a:xfrm>
-          <a:prstGeom prst="rect">
-            <a:avLst/>
-          </a:prstGeom>
-        </p:spPr>
-        <p:txBody>
-          <a:bodyPr vert="horz" lIns="91440" tIns="45720" rIns="91440" bIns="45720" rtlCol="0">
-            <a:normAutofit/>
-          </a:bodyPr>
-          <a:lstStyle/>
-          <a:p>
-            <a:pPr lvl="0"/>
-            <a:r>
-              <a:rPr lang="en-US"/>
-              <a:t>Edit Master text styles</a:t>
-            </a:r>
-          </a:p>
-          <a:p>
-            <a:pPr lvl="1"/>
-            <a:r>
-              <a:rPr lang="en-US"/>
-              <a:t>Second level</a:t>
-            </a:r>
-          </a:p>
-          <a:p>
-            <a:pPr lvl="2"/>
-            <a:r>
-              <a:rPr lang="en-US"/>
-              <a:t>Third level</a:t>
-            </a:r>
-          </a:p>
-          <a:p>
-            <a:pPr lvl="3"/>
-            <a:r>
-              <a:rPr lang="en-US"/>
-              <a:t>Fourth level</a:t>
-            </a:r>
-          </a:p>
-          <a:p>
-            <a:pPr lvl="4"/>
-            <a:r>
-              <a:rPr lang="en-US"/>
-              <a:t>Fifth level</a:t>
-            </a:r>
-          </a:p>
-        </p:txBody>
-      </p:sp>
-      <p:sp>
-        <p:nvSpPr>
-          <p:cNvPr id="4" name="Date Placeholder 3">
-            <a:extLst>
-              <a:ext uri="{FF2B5EF4-FFF2-40B4-BE49-F238E27FC236}">
-                <a16:creationId xmlns:a16="http://schemas.microsoft.com/office/drawing/2014/main" id="{80090691-869C-4DB5-873E-DD6998782117}"/>
-              </a:ext>
-            </a:extLst>
-          </p:cNvPr>
-          <p:cNvSpPr>
-            <a:spLocks noGrp="1"/>
-          </p:cNvSpPr>
-          <p:nvPr>
-            <p:ph type="dt" sz="half" idx="2"/>
-          </p:nvPr>
-        </p:nvSpPr>
-        <p:spPr>
-          <a:xfrm>
-            <a:off x="838200" y="6356350"/>
-            <a:ext cx="2743200" cy="365125"/>
-          </a:xfrm>
-          <a:prstGeom prst="rect">
-            <a:avLst/>
-          </a:prstGeom>
-        </p:spPr>
-        <p:txBody>
-          <a:bodyPr vert="horz" lIns="91440" tIns="45720" rIns="91440" bIns="45720" rtlCol="0" anchor="ctr"/>
-          <a:lstStyle>
-            <a:lvl1pPr algn="l">
-              <a:defRPr sz="1200">
-                <a:solidFill>
-                  <a:schemeClr val="tx1">
-                    <a:tint val="75000"/>
-                  </a:schemeClr>
-                </a:solidFill>
-              </a:defRPr>
-            </a:lvl1pPr>
-          </a:lstStyle>
-          <a:p>
-            <a:fld id="{455227EA-F02B-4D7E-B40B-53F8684A6DEC}" type="datetimeFigureOut">
-              <a:rPr lang="en-US" smtClean="0"/>
-              <a:t>12/17/2018</a:t>
-            </a:fld>
-            <a:endParaRPr lang="en-US"/>
-          </a:p>
-        </p:txBody>
-      </p:sp>
-      <p:sp>
-        <p:nvSpPr>
-          <p:cNvPr id="5" name="Footer Placeholder 4">
-            <a:extLst>
-              <a:ext uri="{FF2B5EF4-FFF2-40B4-BE49-F238E27FC236}">
-                <a16:creationId xmlns:a16="http://schemas.microsoft.com/office/drawing/2014/main" id="{8EF39310-5F1F-4D1E-A824-6B0765AA99D9}"/>
-              </a:ext>
-            </a:extLst>
-          </p:cNvPr>
-          <p:cNvSpPr>
-            <a:spLocks noGrp="1"/>
-          </p:cNvSpPr>
-          <p:nvPr>
-            <p:ph type="ftr" sz="quarter" idx="3"/>
-          </p:nvPr>
-        </p:nvSpPr>
-        <p:spPr>
-          <a:xfrm>
-            <a:off x="4038600" y="6356350"/>
-            <a:ext cx="4114800" cy="365125"/>
-          </a:xfrm>
-          <a:prstGeom prst="rect">
-            <a:avLst/>
-          </a:prstGeom>
-        </p:spPr>
-        <p:txBody>
-          <a:bodyPr vert="horz" lIns="91440" tIns="45720" rIns="91440" bIns="45720" rtlCol="0" anchor="ctr"/>
-          <a:lstStyle>
-            <a:lvl1pPr algn="ctr">
-              <a:defRPr sz="1200">
-                <a:solidFill>
-                  <a:schemeClr val="tx1">
-                    <a:tint val="75000"/>
-                  </a:schemeClr>
-                </a:solidFill>
-              </a:defRPr>
-            </a:lvl1pPr>
-          </a:lstStyle>
-          <a:p>
-            <a:endParaRPr lang="en-US"/>
-          </a:p>
-        </p:txBody>
-      </p:sp>
-      <p:sp>
-        <p:nvSpPr>
-          <p:cNvPr id="6" name="Slide Number Placeholder 5">
-            <a:extLst>
-              <a:ext uri="{FF2B5EF4-FFF2-40B4-BE49-F238E27FC236}">
-                <a16:creationId xmlns:a16="http://schemas.microsoft.com/office/drawing/2014/main" id="{EECBD2F9-8D17-4AF7-B15D-8E2C81B5B957}"/>
-              </a:ext>
-            </a:extLst>
-          </p:cNvPr>
-          <p:cNvSpPr>
-            <a:spLocks noGrp="1"/>
-          </p:cNvSpPr>
-          <p:nvPr>
-            <p:ph type="sldNum" sz="quarter" idx="4"/>
-          </p:nvPr>
-        </p:nvSpPr>
-        <p:spPr>
-          <a:xfrm>
-            <a:off x="8610600" y="6356350"/>
-            <a:ext cx="2743200" cy="365125"/>
-          </a:xfrm>
-          <a:prstGeom prst="rect">
-            <a:avLst/>
-          </a:prstGeom>
-        </p:spPr>
-        <p:txBody>
-          <a:bodyPr vert="horz" lIns="91440" tIns="45720" rIns="91440" bIns="45720" rtlCol="0" anchor="ctr"/>
-          <a:lstStyle>
-            <a:lvl1pPr algn="r">
-              <a:defRPr sz="1200">
-                <a:solidFill>
-                  <a:schemeClr val="tx1">
-                    <a:tint val="75000"/>
-                  </a:schemeClr>
-                </a:solidFill>
-              </a:defRPr>
-            </a:lvl1pPr>
-          </a:lstStyle>
-          <a:p>
-            <a:fld id="{946EE452-F5FC-468E-B1D8-5E642B6AA444}" type="slidenum">
-              <a:rPr lang="en-US" smtClean="0"/>
-              <a:t>‹#›</a:t>
-            </a:fld>
-            <a:endParaRPr lang="en-US"/>
-          </a:p>
-        </p:txBody>
-      </p:sp>
-    </p:spTree>
-    <p:extLst>
-      <p:ext uri="{BB962C8B-B14F-4D97-AF65-F5344CB8AC3E}">
-        <p14:creationId xmlns:p14="http://schemas.microsoft.com/office/powerpoint/2010/main" val="4028779201"/>
-      </p:ext>
-    </p:extLst>
-  </p:cSld>
-  <p:clrMap bg1="lt1" tx1="dk1" bg2="lt2" tx2="dk2" accent1="accent1" accent2="accent2" accent3="accent3" accent4="accent4" accent5="accent5" accent6="accent6" hlink="hlink" folHlink="folHlink"/>
-  <p:sldLayoutIdLst>
-    <p:sldLayoutId id="2147483649" r:id="rId1"/>
-    <p:sldLayoutId id="2147483650" r:id="rId2"/>
-    <p:sldLayoutId id="2147483651" r:id="rId3"/>
-    <p:sldLayoutId id="2147483652" r:id="rId4"/>
-    <p:sldLayoutId id="2147483653" r:id="rId5"/>
-    <p:sldLayoutId id="2147483654" r:id="rId6"/>
-    <p:sldLayoutId id="2147483655" r:id="rId7"/>
-    <p:sldLayoutId id="2147483656" r:id="rId8"/>
-    <p:sldLayoutId id="2147483657" r:id="rId9"/>
-    <p:sldLayoutId id="2147483658" r:id="rId10"/>
-    <p:sldLayoutId id="2147483659" r:id="rId11"/>
-  </p:sldLayoutIdLst>
-  <p:txStyles>
-    <p:titleStyle>
-      <a:lvl1pPr algn="l" defTabSz="914400" rtl="0" eaLnBrk="1" latinLnBrk="0" hangingPunct="1">
-        <a:lnSpc>
-          <a:spcPct val="90000"/>
-        </a:lnSpc>
-        <a:spcBef>
-          <a:spcPct val="0"/>
-        </a:spcBef>
-        <a:buNone/>
-        <a:defRPr sz="4400" kern="1200">
-          <a:solidFill>
-            <a:schemeClr val="tx1"/>
-          </a:solidFill>
-          <a:latin typeface="+mj-lt"/>
-          <a:ea typeface="+mj-ea"/>
-          <a:cs typeface="+mj-cs"/>
-        </a:defRPr>
-      </a:lvl1pPr>
-    </p:titleStyle>
-    <p:bodyStyle>
-      <a:lvl1pPr marL="228600" indent="-228600" algn="l" defTabSz="914400" rtl="0" eaLnBrk="1" latinLnBrk="0" hangingPunct="1">
-        <a:lnSpc>
-          <a:spcPct val="90000"/>
-        </a:lnSpc>
-        <a:spcBef>
-          <a:spcPts val="1000"/>
-        </a:spcBef>
-        <a:buFont typeface="Arial" panose="020B0604020202020204" pitchFamily="34" charset="0"/>
-        <a:buChar char="•"/>
-        <a:defRPr sz="2800" kern="1200">
-          <a:solidFill>
-            <a:schemeClr val="tx1"/>
-          </a:solidFill>
-          <a:latin typeface="+mn-lt"/>
-          <a:ea typeface="+mn-ea"/>
-          <a:cs typeface="+mn-cs"/>
-        </a:defRPr>
-      </a:lvl1pPr>
-      <a:lvl2pPr marL="685800" indent="-228600" algn="l" defTabSz="914400" rtl="0" eaLnBrk="1" latinLnBrk="0" hangingPunct="1">
-        <a:lnSpc>
-          <a:spcPct val="90000"/>
-        </a:lnSpc>
-        <a:spcBef>
-          <a:spcPts val="500"/>
-        </a:spcBef>
-        <a:buFont typeface="Arial" panose="020B0604020202020204" pitchFamily="34" charset="0"/>
-        <a:buChar char="•"/>
-        <a:defRPr sz="2400" kern="1200">
-          <a:solidFill>
-            <a:schemeClr val="tx1"/>
-          </a:solidFill>
-          <a:latin typeface="+mn-lt"/>
-          <a:ea typeface="+mn-ea"/>
-          <a:cs typeface="+mn-cs"/>
-        </a:defRPr>
-      </a:lvl2pPr>
-      <a:lvl3pPr marL="1143000" indent="-228600" algn="l" defTabSz="914400" rtl="0" eaLnBrk="1" latinLnBrk="0" hangingPunct="1">
-        <a:lnSpc>
-          <a:spcPct val="90000"/>
-        </a:lnSpc>
-        <a:spcBef>
-          <a:spcPts val="500"/>
-        </a:spcBef>
-        <a:buFont typeface="Arial" panose="020B0604020202020204" pitchFamily="34" charset="0"/>
-        <a:buChar char="•"/>
-        <a:defRPr sz="2000" kern="1200">
-          <a:solidFill>
-            <a:schemeClr val="tx1"/>
-          </a:solidFill>
-          <a:latin typeface="+mn-lt"/>
-          <a:ea typeface="+mn-ea"/>
-          <a:cs typeface="+mn-cs"/>
-        </a:defRPr>
-      </a:lvl3pPr>
-      <a:lvl4pPr marL="1600200" indent="-228600" algn="l" defTabSz="914400" rtl="0" eaLnBrk="1" latinLnBrk="0" hangingPunct="1">
-        <a:lnSpc>
-          <a:spcPct val="90000"/>
-        </a:lnSpc>
-        <a:spcBef>
-          <a:spcPts val="500"/>
-        </a:spcBef>
-        <a:buFont typeface="Arial" panose="020B0604020202020204" pitchFamily="34" charset="0"/>
-        <a:buChar char="•"/>
-        <a:defRPr sz="1800" kern="1200">
-          <a:solidFill>
-            <a:schemeClr val="tx1"/>
-          </a:solidFill>
-          <a:latin typeface="+mn-lt"/>
-          <a:ea typeface="+mn-ea"/>
-          <a:cs typeface="+mn-cs"/>
-        </a:defRPr>
-      </a:lvl4pPr>
-      <a:lvl5pPr marL="2057400" indent="-228600" algn="l" defTabSz="914400" rtl="0" eaLnBrk="1" latinLnBrk="0" hangingPunct="1">
-        <a:lnSpc>
-          <a:spcPct val="90000"/>
-        </a:lnSpc>
-        <a:spcBef>
-          <a:spcPts val="500"/>
-        </a:spcBef>
-        <a:buFont typeface="Arial" panose="020B0604020202020204" pitchFamily="34" charset="0"/>
-        <a:buChar char="•"/>
-        <a:defRPr sz="1800" kern="1200">
-          <a:solidFill>
-            <a:schemeClr val="tx1"/>
-          </a:solidFill>
-          <a:latin typeface="+mn-lt"/>
-          <a:ea typeface="+mn-ea"/>
-          <a:cs typeface="+mn-cs"/>
-        </a:defRPr>
-      </a:lvl5pPr>
-      <a:lvl6pPr marL="2514600" indent="-228600" algn="l" defTabSz="914400" rtl="0" eaLnBrk="1" latinLnBrk="0" hangingPunct="1">
-        <a:lnSpc>
-          <a:spcPct val="90000"/>
-        </a:lnSpc>
-        <a:spcBef>
-          <a:spcPts val="500"/>
-        </a:spcBef>
-        <a:buFont typeface="Arial" panose="020B0604020202020204" pitchFamily="34" charset="0"/>
-        <a:buChar char="•"/>
-        <a:defRPr sz="1800" kern="1200">
-          <a:solidFill>
-            <a:schemeClr val="tx1"/>
-          </a:solidFill>
-          <a:latin typeface="+mn-lt"/>
-          <a:ea typeface="+mn-ea"/>
-          <a:cs typeface="+mn-cs"/>
-        </a:defRPr>
-      </a:lvl6pPr>
-      <a:lvl7pPr marL="2971800" indent="-228600" algn="l" defTabSz="914400" rtl="0" eaLnBrk="1" latinLnBrk="0" hangingPunct="1">
-        <a:lnSpc>
-          <a:spcPct val="90000"/>
-        </a:lnSpc>
-        <a:spcBef>
-          <a:spcPts val="500"/>
-        </a:spcBef>
-        <a:buFont typeface="Arial" panose="020B0604020202020204" pitchFamily="34" charset="0"/>
-        <a:buChar char="•"/>
-        <a:defRPr sz="1800" kern="1200">
-          <a:solidFill>
-            <a:schemeClr val="tx1"/>
-          </a:solidFill>
-          <a:latin typeface="+mn-lt"/>
-          <a:ea typeface="+mn-ea"/>
-          <a:cs typeface="+mn-cs"/>
-        </a:defRPr>
-      </a:lvl7pPr>
-      <a:lvl8pPr marL="3429000" indent="-228600" algn="l" defTabSz="914400" rtl="0" eaLnBrk="1" latinLnBrk="0" hangingPunct="1">
-        <a:lnSpc>
-          <a:spcPct val="90000"/>
-        </a:lnSpc>
-        <a:spcBef>
-          <a:spcPts val="500"/>
-        </a:spcBef>
-        <a:buFont typeface="Arial" panose="020B0604020202020204" pitchFamily="34" charset="0"/>
-        <a:buChar char="•"/>
-        <a:defRPr sz="1800" kern="1200">
-          <a:solidFill>
-            <a:schemeClr val="tx1"/>
-          </a:solidFill>
-          <a:latin typeface="+mn-lt"/>
-          <a:ea typeface="+mn-ea"/>
-          <a:cs typeface="+mn-cs"/>
-        </a:defRPr>
-      </a:lvl8pPr>
-      <a:lvl9pPr marL="3886200" indent="-228600" algn="l" defTabSz="914400" rtl="0" eaLnBrk="1" latinLnBrk="0" hangingPunct="1">
-        <a:lnSpc>
-          <a:spcPct val="90000"/>
-        </a:lnSpc>
-        <a:spcBef>
-          <a:spcPts val="500"/>
-        </a:spcBef>
-        <a:buFont typeface="Arial" panose="020B0604020202020204" pitchFamily="34" charset="0"/>
-        <a:buChar char="•"/>
-        <a:defRPr sz="1800" kern="1200">
-          <a:solidFill>
-            <a:schemeClr val="tx1"/>
-          </a:solidFill>
-          <a:latin typeface="+mn-lt"/>
-          <a:ea typeface="+mn-ea"/>
-          <a:cs typeface="+mn-cs"/>
-        </a:defRPr>
-      </a:lvl9pPr>
-    </p:bodyStyle>
-    <p:otherStyle>
-      <a:defPPr>
-        <a:defRPr lang="en-US"/>
-      </a:defPPr>
-      <a:lvl1pPr marL="0" algn="l" defTabSz="914400" rtl="0" eaLnBrk="1" latinLnBrk="0" hangingPunct="1">
-        <a:defRPr sz="1800" kern="1200">
-          <a:solidFill>
-            <a:schemeClr val="tx1"/>
-          </a:solidFill>
-          <a:latin typeface="+mn-lt"/>
-          <a:ea typeface="+mn-ea"/>
-          <a:cs typeface="+mn-cs"/>
-        </a:defRPr>
-      </a:lvl1pPr>
-      <a:lvl2pPr marL="457200" algn="l" defTabSz="914400" rtl="0" eaLnBrk="1" latinLnBrk="0" hangingPunct="1">
-        <a:defRPr sz="1800" kern="1200">
-          <a:solidFill>
-            <a:schemeClr val="tx1"/>
-          </a:solidFill>
-          <a:latin typeface="+mn-lt"/>
-          <a:ea typeface="+mn-ea"/>
-          <a:cs typeface="+mn-cs"/>
-        </a:defRPr>
-      </a:lvl2pPr>
-      <a:lvl3pPr marL="914400" algn="l" defTabSz="914400" rtl="0" eaLnBrk="1" latinLnBrk="0" hangingPunct="1">
-        <a:defRPr sz="1800" kern="1200">
-          <a:solidFill>
-            <a:schemeClr val="tx1"/>
-          </a:solidFill>
-          <a:latin typeface="+mn-lt"/>
-          <a:ea typeface="+mn-ea"/>
-          <a:cs typeface="+mn-cs"/>
-        </a:defRPr>
-      </a:lvl3pPr>
-      <a:lvl4pPr marL="1371600" algn="l" defTabSz="914400" rtl="0" eaLnBrk="1" latinLnBrk="0" hangingPunct="1">
-        <a:defRPr sz="1800" kern="1200">
-          <a:solidFill>
-            <a:schemeClr val="tx1"/>
-          </a:solidFill>
-          <a:latin typeface="+mn-lt"/>
-          <a:ea typeface="+mn-ea"/>
-          <a:cs typeface="+mn-cs"/>
-        </a:defRPr>
-      </a:lvl4pPr>
-      <a:lvl5pPr marL="1828800" algn="l" defTabSz="914400" rtl="0" eaLnBrk="1" latinLnBrk="0" hangingPunct="1">
-        <a:defRPr sz="1800" kern="1200">
-          <a:solidFill>
-            <a:schemeClr val="tx1"/>
-          </a:solidFill>
-          <a:latin typeface="+mn-lt"/>
-          <a:ea typeface="+mn-ea"/>
-          <a:cs typeface="+mn-cs"/>
-        </a:defRPr>
-      </a:lvl5pPr>
-      <a:lvl6pPr marL="2286000" algn="l" defTabSz="914400" rtl="0" eaLnBrk="1" latinLnBrk="0" hangingPunct="1">
-        <a:defRPr sz="1800" kern="1200">
-          <a:solidFill>
-            <a:schemeClr val="tx1"/>
-          </a:solidFill>
-          <a:latin typeface="+mn-lt"/>
-          <a:ea typeface="+mn-ea"/>
-          <a:cs typeface="+mn-cs"/>
-        </a:defRPr>
-      </a:lvl6pPr>
-      <a:lvl7pPr marL="2743200" algn="l" defTabSz="914400" rtl="0" eaLnBrk="1" latinLnBrk="0" hangingPunct="1">
-        <a:defRPr sz="1800" kern="1200">
-          <a:solidFill>
-            <a:schemeClr val="tx1"/>
-          </a:solidFill>
-          <a:latin typeface="+mn-lt"/>
-          <a:ea typeface="+mn-ea"/>
-          <a:cs typeface="+mn-cs"/>
-        </a:defRPr>
-      </a:lvl7pPr>
-      <a:lvl8pPr marL="3200400" algn="l" defTabSz="914400" rtl="0" eaLnBrk="1" latinLnBrk="0" hangingPunct="1">
-        <a:defRPr sz="1800" kern="1200">
-          <a:solidFill>
-            <a:schemeClr val="tx1"/>
-          </a:solidFill>
-          <a:latin typeface="+mn-lt"/>
-          <a:ea typeface="+mn-ea"/>
-          <a:cs typeface="+mn-cs"/>
-        </a:defRPr>
-      </a:lvl8pPr>
-      <a:lvl9pPr marL="3657600" algn="l" defTabSz="914400" rtl="0" eaLnBrk="1" latinLnBrk="0" hangingPunct="1">
-        <a:defRPr sz="1800" kern="1200">
-          <a:solidFill>
-            <a:schemeClr val="tx1"/>
-          </a:solidFill>
-          <a:latin typeface="+mn-lt"/>
-          <a:ea typeface="+mn-ea"/>
-          <a:cs typeface="+mn-cs"/>
-        </a:defRPr>
-      </a:lvl9pPr>
-    </p:otherStyle>
-  </p:txStyles>
-</p:sldMaster>
-</file>
-
-<file path=ppt/slides/slide1.xml><?xml version="1.0" encoding="utf-8"?>
-<p:sld xmlns:a="http://schemas.openxmlformats.org/drawingml/2006/main" xmlns:r="http://schemas.openxmlformats.org/officeDocument/2006/relationships" xmlns:p="http://schemas.openxmlformats.org/presentationml/2006/main">
-  <p:cSld>
-    <p:spTree>
-      <p:nvGrpSpPr>
-        <p:cNvPr id="1" name=""/>
-        <p:cNvGrpSpPr/>
-        <p:nvPr/>
-      </p:nvGrpSpPr>
-      <p:grpSpPr>
-        <a:xfrm>
-          <a:off x="0" y="0"/>
-          <a:ext cx="0" cy="0"/>
-          <a:chOff x="0" y="0"/>
-          <a:chExt cx="0" cy="0"/>
-        </a:xfrm>
-      </p:grpSpPr>
-      <p:graphicFrame>
-        <p:nvGraphicFramePr>
-          <p:cNvPr id="7" name="Diagram 6">
-            <a:extLst>
-              <a:ext uri="{FF2B5EF4-FFF2-40B4-BE49-F238E27FC236}">
-                <a16:creationId xmlns:a16="http://schemas.microsoft.com/office/drawing/2014/main" id="{4BEA3BD4-195B-40EF-9CC6-4DFF3D897C83}"/>
-              </a:ext>
-            </a:extLst>
-          </p:cNvPr>
-          <p:cNvGraphicFramePr/>
-          <p:nvPr>
-            <p:extLst>
-              <p:ext uri="{D42A27DB-BD31-4B8C-83A1-F6EECF244321}">
-                <p14:modId xmlns:p14="http://schemas.microsoft.com/office/powerpoint/2010/main" val="266971247"/>
-              </p:ext>
-            </p:extLst>
-          </p:nvPr>
-        </p:nvGraphicFramePr>
-        <p:xfrm>
-          <a:off x="0" y="0"/>
-          <a:ext cx="12191999" cy="6858000"/>
-        </p:xfrm>
-        <a:graphic>
-          <a:graphicData uri="http://schemas.openxmlformats.org/drawingml/2006/diagram">
-            <dgm:relIds xmlns:dgm="http://schemas.openxmlformats.org/drawingml/2006/diagram" xmlns:r="http://schemas.openxmlformats.org/officeDocument/2006/relationships" r:dm="rId2" r:lo="rId3" r:qs="rId4" r:cs="rId5"/>
-          </a:graphicData>
-        </a:graphic>
-      </p:graphicFrame>
-    </p:spTree>
-    <p:extLst>
-      <p:ext uri="{BB962C8B-B14F-4D97-AF65-F5344CB8AC3E}">
-        <p14:creationId xmlns:p14="http://schemas.microsoft.com/office/powerpoint/2010/main" val="4274384554"/>
-      </p:ext>
-    </p:extLst>
-  </p:cSld>
-  <p:clrMapOvr>
-    <a:masterClrMapping/>
-  </p:clrMapOvr>
-</p:sld>
-</file>
-
-<file path=ppt/slides/slide2.xml><?xml version="1.0" encoding="utf-8"?>
-<p:sld xmlns:a="http://schemas.openxmlformats.org/drawingml/2006/main" xmlns:r="http://schemas.openxmlformats.org/officeDocument/2006/relationships" xmlns:p="http://schemas.openxmlformats.org/presentationml/2006/main">
-  <p:cSld>
-    <p:spTree>
-      <p:nvGrpSpPr>
-        <p:cNvPr id="1" name=""/>
-        <p:cNvGrpSpPr/>
-        <p:nvPr/>
-      </p:nvGrpSpPr>
-      <p:grpSpPr>
-        <a:xfrm>
-          <a:off x="0" y="0"/>
-          <a:ext cx="0" cy="0"/>
-          <a:chOff x="0" y="0"/>
-          <a:chExt cx="0" cy="0"/>
-        </a:xfrm>
-      </p:grpSpPr>
-      <p:grpSp>
-        <p:nvGrpSpPr>
-          <p:cNvPr id="16" name="Group 15">
-            <a:extLst>
-              <a:ext uri="{FF2B5EF4-FFF2-40B4-BE49-F238E27FC236}">
-                <a16:creationId xmlns:a16="http://schemas.microsoft.com/office/drawing/2014/main" id="{ACFD2933-FC81-43CF-B46C-A581124D0A0D}"/>
-              </a:ext>
-            </a:extLst>
-          </p:cNvPr>
-          <p:cNvGrpSpPr/>
-          <p:nvPr/>
-        </p:nvGrpSpPr>
-        <p:grpSpPr>
-          <a:xfrm>
-            <a:off x="89647" y="62753"/>
-            <a:ext cx="11999259" cy="6728012"/>
-            <a:chOff x="1873374" y="1692775"/>
-            <a:chExt cx="8445250" cy="4746278"/>
-          </a:xfrm>
-        </p:grpSpPr>
-        <p:sp>
-          <p:nvSpPr>
-            <p:cNvPr id="4" name="Freeform: Shape 3">
-              <a:extLst>
-                <a:ext uri="{FF2B5EF4-FFF2-40B4-BE49-F238E27FC236}">
-                  <a16:creationId xmlns:a16="http://schemas.microsoft.com/office/drawing/2014/main" id="{70795770-555F-41EF-8B56-1B5DDC3629C1}"/>
-                </a:ext>
-              </a:extLst>
-            </p:cNvPr>
-            <p:cNvSpPr/>
-            <p:nvPr/>
-          </p:nvSpPr>
-          <p:spPr>
-            <a:xfrm>
-              <a:off x="4913664" y="1784051"/>
-              <a:ext cx="5404960" cy="730196"/>
-            </a:xfrm>
-            <a:custGeom>
-              <a:avLst/>
-              <a:gdLst>
-                <a:gd name="connsiteX0" fmla="*/ 121702 w 730196"/>
-                <a:gd name="connsiteY0" fmla="*/ 0 h 5404960"/>
-                <a:gd name="connsiteX1" fmla="*/ 608494 w 730196"/>
-                <a:gd name="connsiteY1" fmla="*/ 0 h 5404960"/>
-                <a:gd name="connsiteX2" fmla="*/ 730196 w 730196"/>
-                <a:gd name="connsiteY2" fmla="*/ 121702 h 5404960"/>
-                <a:gd name="connsiteX3" fmla="*/ 730196 w 730196"/>
-                <a:gd name="connsiteY3" fmla="*/ 5404960 h 5404960"/>
-                <a:gd name="connsiteX4" fmla="*/ 730196 w 730196"/>
-                <a:gd name="connsiteY4" fmla="*/ 5404960 h 5404960"/>
-                <a:gd name="connsiteX5" fmla="*/ 0 w 730196"/>
-                <a:gd name="connsiteY5" fmla="*/ 5404960 h 5404960"/>
-                <a:gd name="connsiteX6" fmla="*/ 0 w 730196"/>
-                <a:gd name="connsiteY6" fmla="*/ 5404960 h 5404960"/>
-                <a:gd name="connsiteX7" fmla="*/ 0 w 730196"/>
-                <a:gd name="connsiteY7" fmla="*/ 121702 h 5404960"/>
-                <a:gd name="connsiteX8" fmla="*/ 121702 w 730196"/>
-                <a:gd name="connsiteY8" fmla="*/ 0 h 5404960"/>
-              </a:gdLst>
-              <a:ahLst/>
-              <a:cxnLst>
-                <a:cxn ang="0">
-                  <a:pos x="connsiteX0" y="connsiteY0"/>
-                </a:cxn>
-                <a:cxn ang="0">
-                  <a:pos x="connsiteX1" y="connsiteY1"/>
-                </a:cxn>
-                <a:cxn ang="0">
-                  <a:pos x="connsiteX2" y="connsiteY2"/>
-                </a:cxn>
-                <a:cxn ang="0">
-                  <a:pos x="connsiteX3" y="connsiteY3"/>
-                </a:cxn>
-                <a:cxn ang="0">
-                  <a:pos x="connsiteX4" y="connsiteY4"/>
-                </a:cxn>
-                <a:cxn ang="0">
-                  <a:pos x="connsiteX5" y="connsiteY5"/>
-                </a:cxn>
-                <a:cxn ang="0">
-                  <a:pos x="connsiteX6" y="connsiteY6"/>
-                </a:cxn>
-                <a:cxn ang="0">
-                  <a:pos x="connsiteX7" y="connsiteY7"/>
-                </a:cxn>
-                <a:cxn ang="0">
-                  <a:pos x="connsiteX8" y="connsiteY8"/>
-                </a:cxn>
-              </a:cxnLst>
-              <a:rect l="l" t="t" r="r" b="b"/>
-              <a:pathLst>
-                <a:path w="730196" h="5404960">
-                  <a:moveTo>
-                    <a:pt x="730196" y="900849"/>
-                  </a:moveTo>
-                  <a:lnTo>
-                    <a:pt x="730196" y="4504111"/>
-                  </a:lnTo>
-                  <a:cubicBezTo>
-                    <a:pt x="730196" y="5001633"/>
-                    <a:pt x="722835" y="5404956"/>
-                    <a:pt x="713754" y="5404956"/>
-                  </a:cubicBezTo>
-                  <a:lnTo>
-                    <a:pt x="0" y="5404956"/>
-                  </a:lnTo>
-                  <a:lnTo>
-                    <a:pt x="0" y="5404956"/>
-                  </a:lnTo>
-                  <a:lnTo>
-                    <a:pt x="0" y="4"/>
-                  </a:lnTo>
-                  <a:lnTo>
-                    <a:pt x="0" y="4"/>
-                  </a:lnTo>
-                  <a:lnTo>
-                    <a:pt x="713754" y="4"/>
-                  </a:lnTo>
-                  <a:cubicBezTo>
-                    <a:pt x="722835" y="4"/>
-                    <a:pt x="730196" y="403327"/>
-                    <a:pt x="730196" y="900849"/>
-                  </a:cubicBezTo>
-                  <a:close/>
-                </a:path>
-              </a:pathLst>
-            </a:custGeom>
-          </p:spPr>
-          <p:style>
-            <a:lnRef idx="2">
-              <a:schemeClr val="accent5">
-                <a:tint val="40000"/>
-                <a:alpha val="90000"/>
-                <a:hueOff val="0"/>
-                <a:satOff val="0"/>
-                <a:lumOff val="0"/>
-                <a:alphaOff val="0"/>
-              </a:schemeClr>
-            </a:lnRef>
-            <a:fillRef idx="1">
-              <a:schemeClr val="accent5">
-                <a:tint val="40000"/>
-                <a:alpha val="90000"/>
-                <a:hueOff val="0"/>
-                <a:satOff val="0"/>
-                <a:lumOff val="0"/>
-                <a:alphaOff val="0"/>
-              </a:schemeClr>
-            </a:fillRef>
-            <a:effectRef idx="0">
-              <a:schemeClr val="accent5">
-                <a:tint val="40000"/>
-                <a:alpha val="90000"/>
-                <a:hueOff val="0"/>
-                <a:satOff val="0"/>
-                <a:lumOff val="0"/>
-                <a:alphaOff val="0"/>
-              </a:schemeClr>
-            </a:effectRef>
-            <a:fontRef idx="minor">
-              <a:schemeClr val="dk1">
-                <a:hueOff val="0"/>
-                <a:satOff val="0"/>
-                <a:lumOff val="0"/>
-                <a:alphaOff val="0"/>
-              </a:schemeClr>
-            </a:fontRef>
-          </p:style>
-          <p:txBody>
-            <a:bodyPr spcFirstLastPara="0" vert="horz" wrap="square" lIns="76201" tIns="73744" rIns="111844" bIns="73746" numCol="1" spcCol="1270" anchor="ctr" anchorCtr="0">
-              <a:noAutofit/>
-            </a:bodyPr>
-            <a:lstStyle/>
-            <a:p>
-              <a:pPr marL="228600" lvl="1" indent="-228600" algn="l" defTabSz="889000">
-                <a:lnSpc>
-                  <a:spcPct val="90000"/>
-                </a:lnSpc>
-                <a:spcBef>
-                  <a:spcPct val="0"/>
-                </a:spcBef>
-                <a:spcAft>
-                  <a:spcPct val="15000"/>
-                </a:spcAft>
-                <a:buChar char="•"/>
-              </a:pPr>
-              <a:r>
-                <a:rPr lang="en-US" sz="2000" kern="1200" dirty="0"/>
-                <a:t>Detect as many bad frames as possible using conventional methods</a:t>
-              </a:r>
-            </a:p>
-          </p:txBody>
-        </p:sp>
-        <p:sp>
-          <p:nvSpPr>
-            <p:cNvPr id="5" name="Freeform: Shape 4">
-              <a:extLst>
-                <a:ext uri="{FF2B5EF4-FFF2-40B4-BE49-F238E27FC236}">
-                  <a16:creationId xmlns:a16="http://schemas.microsoft.com/office/drawing/2014/main" id="{4770AC85-B11D-4BE0-8FD3-0A1EEC8267A8}"/>
-                </a:ext>
-              </a:extLst>
-            </p:cNvPr>
-            <p:cNvSpPr/>
-            <p:nvPr/>
-          </p:nvSpPr>
-          <p:spPr>
-            <a:xfrm>
-              <a:off x="1873374" y="1692775"/>
-              <a:ext cx="3040290" cy="912745"/>
-            </a:xfrm>
-            <a:custGeom>
-              <a:avLst/>
-              <a:gdLst>
-                <a:gd name="connsiteX0" fmla="*/ 0 w 3040290"/>
-                <a:gd name="connsiteY0" fmla="*/ 152127 h 912745"/>
-                <a:gd name="connsiteX1" fmla="*/ 152127 w 3040290"/>
-                <a:gd name="connsiteY1" fmla="*/ 0 h 912745"/>
-                <a:gd name="connsiteX2" fmla="*/ 2888163 w 3040290"/>
-                <a:gd name="connsiteY2" fmla="*/ 0 h 912745"/>
-                <a:gd name="connsiteX3" fmla="*/ 3040290 w 3040290"/>
-                <a:gd name="connsiteY3" fmla="*/ 152127 h 912745"/>
-                <a:gd name="connsiteX4" fmla="*/ 3040290 w 3040290"/>
-                <a:gd name="connsiteY4" fmla="*/ 760618 h 912745"/>
-                <a:gd name="connsiteX5" fmla="*/ 2888163 w 3040290"/>
-                <a:gd name="connsiteY5" fmla="*/ 912745 h 912745"/>
-                <a:gd name="connsiteX6" fmla="*/ 152127 w 3040290"/>
-                <a:gd name="connsiteY6" fmla="*/ 912745 h 912745"/>
-                <a:gd name="connsiteX7" fmla="*/ 0 w 3040290"/>
-                <a:gd name="connsiteY7" fmla="*/ 760618 h 912745"/>
-                <a:gd name="connsiteX8" fmla="*/ 0 w 3040290"/>
-                <a:gd name="connsiteY8" fmla="*/ 152127 h 912745"/>
-              </a:gdLst>
-              <a:ahLst/>
-              <a:cxnLst>
-                <a:cxn ang="0">
-                  <a:pos x="connsiteX0" y="connsiteY0"/>
-                </a:cxn>
-                <a:cxn ang="0">
-                  <a:pos x="connsiteX1" y="connsiteY1"/>
-                </a:cxn>
-                <a:cxn ang="0">
-                  <a:pos x="connsiteX2" y="connsiteY2"/>
-                </a:cxn>
-                <a:cxn ang="0">
-                  <a:pos x="connsiteX3" y="connsiteY3"/>
-                </a:cxn>
-                <a:cxn ang="0">
-                  <a:pos x="connsiteX4" y="connsiteY4"/>
-                </a:cxn>
-                <a:cxn ang="0">
-                  <a:pos x="connsiteX5" y="connsiteY5"/>
-                </a:cxn>
-                <a:cxn ang="0">
-                  <a:pos x="connsiteX6" y="connsiteY6"/>
-                </a:cxn>
-                <a:cxn ang="0">
-                  <a:pos x="connsiteX7" y="connsiteY7"/>
-                </a:cxn>
-                <a:cxn ang="0">
-                  <a:pos x="connsiteX8" y="connsiteY8"/>
-                </a:cxn>
-              </a:cxnLst>
-              <a:rect l="l" t="t" r="r" b="b"/>
-              <a:pathLst>
-                <a:path w="3040290" h="912745">
-                  <a:moveTo>
-                    <a:pt x="0" y="152127"/>
-                  </a:moveTo>
-                  <a:cubicBezTo>
-                    <a:pt x="0" y="68110"/>
-                    <a:pt x="68110" y="0"/>
-                    <a:pt x="152127" y="0"/>
-                  </a:cubicBezTo>
-                  <a:lnTo>
-                    <a:pt x="2888163" y="0"/>
-                  </a:lnTo>
-                  <a:cubicBezTo>
-                    <a:pt x="2972180" y="0"/>
-                    <a:pt x="3040290" y="68110"/>
-                    <a:pt x="3040290" y="152127"/>
-                  </a:cubicBezTo>
-                  <a:lnTo>
-                    <a:pt x="3040290" y="760618"/>
-                  </a:lnTo>
-                  <a:cubicBezTo>
-                    <a:pt x="3040290" y="844635"/>
-                    <a:pt x="2972180" y="912745"/>
-                    <a:pt x="2888163" y="912745"/>
-                  </a:cubicBezTo>
-                  <a:lnTo>
-                    <a:pt x="152127" y="912745"/>
-                  </a:lnTo>
-                  <a:cubicBezTo>
-                    <a:pt x="68110" y="912745"/>
-                    <a:pt x="0" y="844635"/>
-                    <a:pt x="0" y="760618"/>
-                  </a:cubicBezTo>
-                  <a:lnTo>
-                    <a:pt x="0" y="152127"/>
-                  </a:lnTo>
-                  <a:close/>
-                </a:path>
-              </a:pathLst>
-            </a:custGeom>
-          </p:spPr>
-          <p:style>
-            <a:lnRef idx="2">
-              <a:schemeClr val="lt1">
-                <a:hueOff val="0"/>
-                <a:satOff val="0"/>
-                <a:lumOff val="0"/>
-                <a:alphaOff val="0"/>
-              </a:schemeClr>
-            </a:lnRef>
-            <a:fillRef idx="1">
-              <a:schemeClr val="accent5">
-                <a:hueOff val="0"/>
-                <a:satOff val="0"/>
-                <a:lumOff val="0"/>
-                <a:alphaOff val="0"/>
-              </a:schemeClr>
-            </a:fillRef>
-            <a:effectRef idx="0">
-              <a:schemeClr val="accent5">
-                <a:hueOff val="0"/>
-                <a:satOff val="0"/>
-                <a:lumOff val="0"/>
-                <a:alphaOff val="0"/>
-              </a:schemeClr>
-            </a:effectRef>
-            <a:fontRef idx="minor">
-              <a:schemeClr val="lt1"/>
-            </a:fontRef>
-          </p:style>
-          <p:txBody>
-            <a:bodyPr spcFirstLastPara="0" vert="horz" wrap="square" lIns="166477" tIns="105517" rIns="166477" bIns="105517" numCol="1" spcCol="1270" anchor="ctr" anchorCtr="0">
-              <a:noAutofit/>
-            </a:bodyPr>
-            <a:lstStyle/>
-            <a:p>
-              <a:pPr marL="0" lvl="0" indent="0" algn="ctr" defTabSz="1422400">
-                <a:lnSpc>
-                  <a:spcPct val="90000"/>
-                </a:lnSpc>
-                <a:spcBef>
-                  <a:spcPct val="0"/>
-                </a:spcBef>
-                <a:spcAft>
-                  <a:spcPct val="35000"/>
-                </a:spcAft>
-                <a:buNone/>
-              </a:pPr>
-              <a:r>
-                <a:rPr lang="en-US" sz="3200" kern="1200" dirty="0"/>
-                <a:t>Preprocessing</a:t>
-              </a:r>
-            </a:p>
-          </p:txBody>
-        </p:sp>
-        <p:sp>
-          <p:nvSpPr>
-            <p:cNvPr id="6" name="Freeform: Shape 5">
-              <a:extLst>
-                <a:ext uri="{FF2B5EF4-FFF2-40B4-BE49-F238E27FC236}">
-                  <a16:creationId xmlns:a16="http://schemas.microsoft.com/office/drawing/2014/main" id="{64F829D0-DE48-4CB6-8938-10BA4535712A}"/>
-                </a:ext>
-              </a:extLst>
-            </p:cNvPr>
-            <p:cNvSpPr/>
-            <p:nvPr/>
-          </p:nvSpPr>
-          <p:spPr>
-            <a:xfrm>
-              <a:off x="4913664" y="2742434"/>
-              <a:ext cx="5404960" cy="730196"/>
-            </a:xfrm>
-            <a:custGeom>
-              <a:avLst/>
-              <a:gdLst>
-                <a:gd name="connsiteX0" fmla="*/ 121702 w 730196"/>
-                <a:gd name="connsiteY0" fmla="*/ 0 h 5404960"/>
-                <a:gd name="connsiteX1" fmla="*/ 608494 w 730196"/>
-                <a:gd name="connsiteY1" fmla="*/ 0 h 5404960"/>
-                <a:gd name="connsiteX2" fmla="*/ 730196 w 730196"/>
-                <a:gd name="connsiteY2" fmla="*/ 121702 h 5404960"/>
-                <a:gd name="connsiteX3" fmla="*/ 730196 w 730196"/>
-                <a:gd name="connsiteY3" fmla="*/ 5404960 h 5404960"/>
-                <a:gd name="connsiteX4" fmla="*/ 730196 w 730196"/>
-                <a:gd name="connsiteY4" fmla="*/ 5404960 h 5404960"/>
-                <a:gd name="connsiteX5" fmla="*/ 0 w 730196"/>
-                <a:gd name="connsiteY5" fmla="*/ 5404960 h 5404960"/>
-                <a:gd name="connsiteX6" fmla="*/ 0 w 730196"/>
-                <a:gd name="connsiteY6" fmla="*/ 5404960 h 5404960"/>
-                <a:gd name="connsiteX7" fmla="*/ 0 w 730196"/>
-                <a:gd name="connsiteY7" fmla="*/ 121702 h 5404960"/>
-                <a:gd name="connsiteX8" fmla="*/ 121702 w 730196"/>
-                <a:gd name="connsiteY8" fmla="*/ 0 h 5404960"/>
-              </a:gdLst>
-              <a:ahLst/>
-              <a:cxnLst>
-                <a:cxn ang="0">
-                  <a:pos x="connsiteX0" y="connsiteY0"/>
-                </a:cxn>
-                <a:cxn ang="0">
-                  <a:pos x="connsiteX1" y="connsiteY1"/>
-                </a:cxn>
-                <a:cxn ang="0">
-                  <a:pos x="connsiteX2" y="connsiteY2"/>
-                </a:cxn>
-                <a:cxn ang="0">
-                  <a:pos x="connsiteX3" y="connsiteY3"/>
-                </a:cxn>
-                <a:cxn ang="0">
-                  <a:pos x="connsiteX4" y="connsiteY4"/>
-                </a:cxn>
-                <a:cxn ang="0">
-                  <a:pos x="connsiteX5" y="connsiteY5"/>
-                </a:cxn>
-                <a:cxn ang="0">
-                  <a:pos x="connsiteX6" y="connsiteY6"/>
-                </a:cxn>
-                <a:cxn ang="0">
-                  <a:pos x="connsiteX7" y="connsiteY7"/>
-                </a:cxn>
-                <a:cxn ang="0">
-                  <a:pos x="connsiteX8" y="connsiteY8"/>
-                </a:cxn>
-              </a:cxnLst>
-              <a:rect l="l" t="t" r="r" b="b"/>
-              <a:pathLst>
-                <a:path w="730196" h="5404960">
-                  <a:moveTo>
-                    <a:pt x="730196" y="900849"/>
-                  </a:moveTo>
-                  <a:lnTo>
-                    <a:pt x="730196" y="4504111"/>
-                  </a:lnTo>
-                  <a:cubicBezTo>
-                    <a:pt x="730196" y="5001633"/>
-                    <a:pt x="722835" y="5404956"/>
-                    <a:pt x="713754" y="5404956"/>
-                  </a:cubicBezTo>
-                  <a:lnTo>
-                    <a:pt x="0" y="5404956"/>
-                  </a:lnTo>
-                  <a:lnTo>
-                    <a:pt x="0" y="5404956"/>
-                  </a:lnTo>
-                  <a:lnTo>
-                    <a:pt x="0" y="4"/>
-                  </a:lnTo>
-                  <a:lnTo>
-                    <a:pt x="0" y="4"/>
-                  </a:lnTo>
-                  <a:lnTo>
-                    <a:pt x="713754" y="4"/>
-                  </a:lnTo>
-                  <a:cubicBezTo>
-                    <a:pt x="722835" y="4"/>
-                    <a:pt x="730196" y="403327"/>
-                    <a:pt x="730196" y="900849"/>
-                  </a:cubicBezTo>
-                  <a:close/>
-                </a:path>
-              </a:pathLst>
-            </a:custGeom>
-          </p:spPr>
-          <p:style>
-            <a:lnRef idx="2">
-              <a:schemeClr val="accent5">
-                <a:tint val="40000"/>
-                <a:alpha val="90000"/>
-                <a:hueOff val="-1684941"/>
-                <a:satOff val="-5708"/>
-                <a:lumOff val="-732"/>
-                <a:alphaOff val="0"/>
-              </a:schemeClr>
-            </a:lnRef>
-            <a:fillRef idx="1">
-              <a:schemeClr val="accent5">
-                <a:tint val="40000"/>
-                <a:alpha val="90000"/>
-                <a:hueOff val="-1684941"/>
-                <a:satOff val="-5708"/>
-                <a:lumOff val="-732"/>
-                <a:alphaOff val="0"/>
-              </a:schemeClr>
-            </a:fillRef>
-            <a:effectRef idx="0">
-              <a:schemeClr val="accent5">
-                <a:tint val="40000"/>
-                <a:alpha val="90000"/>
-                <a:hueOff val="-1684941"/>
-                <a:satOff val="-5708"/>
-                <a:lumOff val="-732"/>
-                <a:alphaOff val="0"/>
-              </a:schemeClr>
-            </a:effectRef>
-            <a:fontRef idx="minor">
-              <a:schemeClr val="dk1">
-                <a:hueOff val="0"/>
-                <a:satOff val="0"/>
-                <a:lumOff val="0"/>
-                <a:alphaOff val="0"/>
-              </a:schemeClr>
-            </a:fontRef>
-          </p:style>
-          <p:txBody>
-            <a:bodyPr spcFirstLastPara="0" vert="horz" wrap="square" lIns="76201" tIns="73744" rIns="111844" bIns="73746" numCol="1" spcCol="1270" anchor="ctr" anchorCtr="0">
-              <a:noAutofit/>
-            </a:bodyPr>
-            <a:lstStyle/>
-            <a:p>
-              <a:pPr marL="228600" lvl="1" indent="-228600" algn="l" defTabSz="889000">
-                <a:lnSpc>
-                  <a:spcPct val="90000"/>
-                </a:lnSpc>
-                <a:spcBef>
-                  <a:spcPct val="0"/>
-                </a:spcBef>
-                <a:spcAft>
-                  <a:spcPct val="15000"/>
-                </a:spcAft>
-                <a:buChar char="•"/>
-              </a:pPr>
-              <a:r>
-                <a:rPr lang="en-US" sz="2000" kern="1200" dirty="0"/>
-                <a:t>Train deep networks to impute marker positions on short timescales</a:t>
-              </a:r>
-            </a:p>
-          </p:txBody>
-        </p:sp>
-        <p:sp>
-          <p:nvSpPr>
-            <p:cNvPr id="7" name="Freeform: Shape 6">
-              <a:extLst>
-                <a:ext uri="{FF2B5EF4-FFF2-40B4-BE49-F238E27FC236}">
-                  <a16:creationId xmlns:a16="http://schemas.microsoft.com/office/drawing/2014/main" id="{DD5369CD-9DFD-4338-924F-41B14C889FB8}"/>
-                </a:ext>
-              </a:extLst>
-            </p:cNvPr>
-            <p:cNvSpPr/>
-            <p:nvPr/>
-          </p:nvSpPr>
-          <p:spPr>
-            <a:xfrm>
-              <a:off x="1873374" y="2651158"/>
-              <a:ext cx="3040290" cy="912745"/>
-            </a:xfrm>
-            <a:custGeom>
-              <a:avLst/>
-              <a:gdLst>
-                <a:gd name="connsiteX0" fmla="*/ 0 w 3040290"/>
-                <a:gd name="connsiteY0" fmla="*/ 152127 h 912745"/>
-                <a:gd name="connsiteX1" fmla="*/ 152127 w 3040290"/>
-                <a:gd name="connsiteY1" fmla="*/ 0 h 912745"/>
-                <a:gd name="connsiteX2" fmla="*/ 2888163 w 3040290"/>
-                <a:gd name="connsiteY2" fmla="*/ 0 h 912745"/>
-                <a:gd name="connsiteX3" fmla="*/ 3040290 w 3040290"/>
-                <a:gd name="connsiteY3" fmla="*/ 152127 h 912745"/>
-                <a:gd name="connsiteX4" fmla="*/ 3040290 w 3040290"/>
-                <a:gd name="connsiteY4" fmla="*/ 760618 h 912745"/>
-                <a:gd name="connsiteX5" fmla="*/ 2888163 w 3040290"/>
-                <a:gd name="connsiteY5" fmla="*/ 912745 h 912745"/>
-                <a:gd name="connsiteX6" fmla="*/ 152127 w 3040290"/>
-                <a:gd name="connsiteY6" fmla="*/ 912745 h 912745"/>
-                <a:gd name="connsiteX7" fmla="*/ 0 w 3040290"/>
-                <a:gd name="connsiteY7" fmla="*/ 760618 h 912745"/>
-                <a:gd name="connsiteX8" fmla="*/ 0 w 3040290"/>
-                <a:gd name="connsiteY8" fmla="*/ 152127 h 912745"/>
-              </a:gdLst>
-              <a:ahLst/>
-              <a:cxnLst>
-                <a:cxn ang="0">
-                  <a:pos x="connsiteX0" y="connsiteY0"/>
-                </a:cxn>
-                <a:cxn ang="0">
-                  <a:pos x="connsiteX1" y="connsiteY1"/>
-                </a:cxn>
-                <a:cxn ang="0">
-                  <a:pos x="connsiteX2" y="connsiteY2"/>
-                </a:cxn>
-                <a:cxn ang="0">
-                  <a:pos x="connsiteX3" y="connsiteY3"/>
-                </a:cxn>
-                <a:cxn ang="0">
-                  <a:pos x="connsiteX4" y="connsiteY4"/>
-                </a:cxn>
-                <a:cxn ang="0">
-                  <a:pos x="connsiteX5" y="connsiteY5"/>
-                </a:cxn>
-                <a:cxn ang="0">
-                  <a:pos x="connsiteX6" y="connsiteY6"/>
-                </a:cxn>
-                <a:cxn ang="0">
-                  <a:pos x="connsiteX7" y="connsiteY7"/>
-                </a:cxn>
-                <a:cxn ang="0">
-                  <a:pos x="connsiteX8" y="connsiteY8"/>
-                </a:cxn>
-              </a:cxnLst>
-              <a:rect l="l" t="t" r="r" b="b"/>
-              <a:pathLst>
-                <a:path w="3040290" h="912745">
-                  <a:moveTo>
-                    <a:pt x="0" y="152127"/>
-                  </a:moveTo>
-                  <a:cubicBezTo>
-                    <a:pt x="0" y="68110"/>
-                    <a:pt x="68110" y="0"/>
-                    <a:pt x="152127" y="0"/>
-                  </a:cubicBezTo>
-                  <a:lnTo>
-                    <a:pt x="2888163" y="0"/>
-                  </a:lnTo>
-                  <a:cubicBezTo>
-                    <a:pt x="2972180" y="0"/>
-                    <a:pt x="3040290" y="68110"/>
-                    <a:pt x="3040290" y="152127"/>
-                  </a:cubicBezTo>
-                  <a:lnTo>
-                    <a:pt x="3040290" y="760618"/>
-                  </a:lnTo>
-                  <a:cubicBezTo>
-                    <a:pt x="3040290" y="844635"/>
-                    <a:pt x="2972180" y="912745"/>
-                    <a:pt x="2888163" y="912745"/>
-                  </a:cubicBezTo>
-                  <a:lnTo>
-                    <a:pt x="152127" y="912745"/>
-                  </a:lnTo>
-                  <a:cubicBezTo>
-                    <a:pt x="68110" y="912745"/>
-                    <a:pt x="0" y="844635"/>
-                    <a:pt x="0" y="760618"/>
-                  </a:cubicBezTo>
-                  <a:lnTo>
-                    <a:pt x="0" y="152127"/>
-                  </a:lnTo>
-                  <a:close/>
-                </a:path>
-              </a:pathLst>
-            </a:custGeom>
-          </p:spPr>
-          <p:style>
-            <a:lnRef idx="2">
-              <a:schemeClr val="lt1">
-                <a:hueOff val="0"/>
-                <a:satOff val="0"/>
-                <a:lumOff val="0"/>
-                <a:alphaOff val="0"/>
-              </a:schemeClr>
-            </a:lnRef>
-            <a:fillRef idx="1">
-              <a:schemeClr val="accent5">
-                <a:hueOff val="-1689636"/>
-                <a:satOff val="-4355"/>
-                <a:lumOff val="-2941"/>
-                <a:alphaOff val="0"/>
-              </a:schemeClr>
-            </a:fillRef>
-            <a:effectRef idx="0">
-              <a:schemeClr val="accent5">
-                <a:hueOff val="-1689636"/>
-                <a:satOff val="-4355"/>
-                <a:lumOff val="-2941"/>
-                <a:alphaOff val="0"/>
-              </a:schemeClr>
-            </a:effectRef>
-            <a:fontRef idx="minor">
-              <a:schemeClr val="lt1"/>
-            </a:fontRef>
-          </p:style>
-          <p:txBody>
-            <a:bodyPr spcFirstLastPara="0" vert="horz" wrap="square" lIns="166477" tIns="105517" rIns="166477" bIns="105517" numCol="1" spcCol="1270" anchor="ctr" anchorCtr="0">
-              <a:noAutofit/>
-            </a:bodyPr>
-            <a:lstStyle/>
-            <a:p>
-              <a:pPr marL="0" lvl="0" indent="0" algn="ctr" defTabSz="1422400">
-                <a:lnSpc>
-                  <a:spcPct val="90000"/>
-                </a:lnSpc>
-                <a:spcBef>
-                  <a:spcPct val="0"/>
-                </a:spcBef>
-                <a:spcAft>
-                  <a:spcPct val="35000"/>
-                </a:spcAft>
-                <a:buNone/>
-              </a:pPr>
-              <a:r>
-                <a:rPr lang="en-US" sz="3200" kern="1200" dirty="0"/>
-                <a:t>Training</a:t>
-              </a:r>
-            </a:p>
-          </p:txBody>
-        </p:sp>
-        <p:sp>
-          <p:nvSpPr>
-            <p:cNvPr id="8" name="Freeform: Shape 7">
-              <a:extLst>
-                <a:ext uri="{FF2B5EF4-FFF2-40B4-BE49-F238E27FC236}">
-                  <a16:creationId xmlns:a16="http://schemas.microsoft.com/office/drawing/2014/main" id="{27C4AE81-56BF-4648-9E4F-E37A6AE8E6B8}"/>
-                </a:ext>
-              </a:extLst>
-            </p:cNvPr>
-            <p:cNvSpPr/>
-            <p:nvPr/>
-          </p:nvSpPr>
-          <p:spPr>
-            <a:xfrm>
-              <a:off x="4913664" y="3700817"/>
-              <a:ext cx="5404960" cy="730196"/>
-            </a:xfrm>
-            <a:custGeom>
-              <a:avLst/>
-              <a:gdLst>
-                <a:gd name="connsiteX0" fmla="*/ 121702 w 730196"/>
-                <a:gd name="connsiteY0" fmla="*/ 0 h 5404960"/>
-                <a:gd name="connsiteX1" fmla="*/ 608494 w 730196"/>
-                <a:gd name="connsiteY1" fmla="*/ 0 h 5404960"/>
-                <a:gd name="connsiteX2" fmla="*/ 730196 w 730196"/>
-                <a:gd name="connsiteY2" fmla="*/ 121702 h 5404960"/>
-                <a:gd name="connsiteX3" fmla="*/ 730196 w 730196"/>
-                <a:gd name="connsiteY3" fmla="*/ 5404960 h 5404960"/>
-                <a:gd name="connsiteX4" fmla="*/ 730196 w 730196"/>
-                <a:gd name="connsiteY4" fmla="*/ 5404960 h 5404960"/>
-                <a:gd name="connsiteX5" fmla="*/ 0 w 730196"/>
-                <a:gd name="connsiteY5" fmla="*/ 5404960 h 5404960"/>
-                <a:gd name="connsiteX6" fmla="*/ 0 w 730196"/>
-                <a:gd name="connsiteY6" fmla="*/ 5404960 h 5404960"/>
-                <a:gd name="connsiteX7" fmla="*/ 0 w 730196"/>
-                <a:gd name="connsiteY7" fmla="*/ 121702 h 5404960"/>
-                <a:gd name="connsiteX8" fmla="*/ 121702 w 730196"/>
-                <a:gd name="connsiteY8" fmla="*/ 0 h 5404960"/>
-              </a:gdLst>
-              <a:ahLst/>
-              <a:cxnLst>
-                <a:cxn ang="0">
-                  <a:pos x="connsiteX0" y="connsiteY0"/>
-                </a:cxn>
-                <a:cxn ang="0">
-                  <a:pos x="connsiteX1" y="connsiteY1"/>
-                </a:cxn>
-                <a:cxn ang="0">
-                  <a:pos x="connsiteX2" y="connsiteY2"/>
-                </a:cxn>
-                <a:cxn ang="0">
-                  <a:pos x="connsiteX3" y="connsiteY3"/>
-                </a:cxn>
-                <a:cxn ang="0">
-                  <a:pos x="connsiteX4" y="connsiteY4"/>
-                </a:cxn>
-                <a:cxn ang="0">
-                  <a:pos x="connsiteX5" y="connsiteY5"/>
-                </a:cxn>
-                <a:cxn ang="0">
-                  <a:pos x="connsiteX6" y="connsiteY6"/>
-                </a:cxn>
-                <a:cxn ang="0">
-                  <a:pos x="connsiteX7" y="connsiteY7"/>
-                </a:cxn>
-                <a:cxn ang="0">
-                  <a:pos x="connsiteX8" y="connsiteY8"/>
-                </a:cxn>
-              </a:cxnLst>
-              <a:rect l="l" t="t" r="r" b="b"/>
-              <a:pathLst>
-                <a:path w="730196" h="5404960">
-                  <a:moveTo>
-                    <a:pt x="730196" y="900849"/>
-                  </a:moveTo>
-                  <a:lnTo>
-                    <a:pt x="730196" y="4504111"/>
-                  </a:lnTo>
-                  <a:cubicBezTo>
-                    <a:pt x="730196" y="5001633"/>
-                    <a:pt x="722835" y="5404956"/>
-                    <a:pt x="713754" y="5404956"/>
-                  </a:cubicBezTo>
-                  <a:lnTo>
-                    <a:pt x="0" y="5404956"/>
-                  </a:lnTo>
-                  <a:lnTo>
-                    <a:pt x="0" y="5404956"/>
-                  </a:lnTo>
-                  <a:lnTo>
-                    <a:pt x="0" y="4"/>
-                  </a:lnTo>
-                  <a:lnTo>
-                    <a:pt x="0" y="4"/>
-                  </a:lnTo>
-                  <a:lnTo>
-                    <a:pt x="713754" y="4"/>
-                  </a:lnTo>
-                  <a:cubicBezTo>
-                    <a:pt x="722835" y="4"/>
-                    <a:pt x="730196" y="403327"/>
-                    <a:pt x="730196" y="900849"/>
-                  </a:cubicBezTo>
-                  <a:close/>
-                </a:path>
-              </a:pathLst>
-            </a:custGeom>
-          </p:spPr>
-          <p:style>
-            <a:lnRef idx="2">
-              <a:schemeClr val="accent5">
-                <a:tint val="40000"/>
-                <a:alpha val="90000"/>
-                <a:hueOff val="-3369881"/>
-                <a:satOff val="-11416"/>
-                <a:lumOff val="-1464"/>
-                <a:alphaOff val="0"/>
-              </a:schemeClr>
-            </a:lnRef>
-            <a:fillRef idx="1">
-              <a:schemeClr val="accent5">
-                <a:tint val="40000"/>
-                <a:alpha val="90000"/>
-                <a:hueOff val="-3369881"/>
-                <a:satOff val="-11416"/>
-                <a:lumOff val="-1464"/>
-                <a:alphaOff val="0"/>
-              </a:schemeClr>
-            </a:fillRef>
-            <a:effectRef idx="0">
-              <a:schemeClr val="accent5">
-                <a:tint val="40000"/>
-                <a:alpha val="90000"/>
-                <a:hueOff val="-3369881"/>
-                <a:satOff val="-11416"/>
-                <a:lumOff val="-1464"/>
-                <a:alphaOff val="0"/>
-              </a:schemeClr>
-            </a:effectRef>
-            <a:fontRef idx="minor">
-              <a:schemeClr val="dk1">
-                <a:hueOff val="0"/>
-                <a:satOff val="0"/>
-                <a:lumOff val="0"/>
-                <a:alphaOff val="0"/>
-              </a:schemeClr>
-            </a:fontRef>
-          </p:style>
-          <p:txBody>
-            <a:bodyPr spcFirstLastPara="0" vert="horz" wrap="square" lIns="76201" tIns="73744" rIns="111844" bIns="73746" numCol="1" spcCol="1270" anchor="ctr" anchorCtr="0">
-              <a:noAutofit/>
-            </a:bodyPr>
-            <a:lstStyle/>
-            <a:p>
-              <a:pPr marL="228600" lvl="1" indent="-228600" algn="l" defTabSz="889000">
-                <a:lnSpc>
-                  <a:spcPct val="90000"/>
-                </a:lnSpc>
-                <a:spcBef>
-                  <a:spcPct val="0"/>
-                </a:spcBef>
-                <a:spcAft>
-                  <a:spcPct val="15000"/>
-                </a:spcAft>
-                <a:buChar char="•"/>
-              </a:pPr>
-              <a:r>
-                <a:rPr lang="en-US" sz="2000" kern="1200" dirty="0"/>
-                <a:t>Aggregate multiple models to improve performance</a:t>
-              </a:r>
-            </a:p>
-          </p:txBody>
-        </p:sp>
-        <p:sp>
-          <p:nvSpPr>
-            <p:cNvPr id="9" name="Freeform: Shape 8">
-              <a:extLst>
-                <a:ext uri="{FF2B5EF4-FFF2-40B4-BE49-F238E27FC236}">
-                  <a16:creationId xmlns:a16="http://schemas.microsoft.com/office/drawing/2014/main" id="{70231446-678B-4586-9931-925F4057543D}"/>
-                </a:ext>
-              </a:extLst>
-            </p:cNvPr>
-            <p:cNvSpPr/>
-            <p:nvPr/>
-          </p:nvSpPr>
-          <p:spPr>
-            <a:xfrm>
-              <a:off x="1873374" y="3609542"/>
-              <a:ext cx="3040290" cy="912745"/>
-            </a:xfrm>
-            <a:custGeom>
-              <a:avLst/>
-              <a:gdLst>
-                <a:gd name="connsiteX0" fmla="*/ 0 w 3040290"/>
-                <a:gd name="connsiteY0" fmla="*/ 152127 h 912745"/>
-                <a:gd name="connsiteX1" fmla="*/ 152127 w 3040290"/>
-                <a:gd name="connsiteY1" fmla="*/ 0 h 912745"/>
-                <a:gd name="connsiteX2" fmla="*/ 2888163 w 3040290"/>
-                <a:gd name="connsiteY2" fmla="*/ 0 h 912745"/>
-                <a:gd name="connsiteX3" fmla="*/ 3040290 w 3040290"/>
-                <a:gd name="connsiteY3" fmla="*/ 152127 h 912745"/>
-                <a:gd name="connsiteX4" fmla="*/ 3040290 w 3040290"/>
-                <a:gd name="connsiteY4" fmla="*/ 760618 h 912745"/>
-                <a:gd name="connsiteX5" fmla="*/ 2888163 w 3040290"/>
-                <a:gd name="connsiteY5" fmla="*/ 912745 h 912745"/>
-                <a:gd name="connsiteX6" fmla="*/ 152127 w 3040290"/>
-                <a:gd name="connsiteY6" fmla="*/ 912745 h 912745"/>
-                <a:gd name="connsiteX7" fmla="*/ 0 w 3040290"/>
-                <a:gd name="connsiteY7" fmla="*/ 760618 h 912745"/>
-                <a:gd name="connsiteX8" fmla="*/ 0 w 3040290"/>
-                <a:gd name="connsiteY8" fmla="*/ 152127 h 912745"/>
-              </a:gdLst>
-              <a:ahLst/>
-              <a:cxnLst>
-                <a:cxn ang="0">
-                  <a:pos x="connsiteX0" y="connsiteY0"/>
-                </a:cxn>
-                <a:cxn ang="0">
-                  <a:pos x="connsiteX1" y="connsiteY1"/>
-                </a:cxn>
-                <a:cxn ang="0">
-                  <a:pos x="connsiteX2" y="connsiteY2"/>
-                </a:cxn>
-                <a:cxn ang="0">
-                  <a:pos x="connsiteX3" y="connsiteY3"/>
-                </a:cxn>
-                <a:cxn ang="0">
-                  <a:pos x="connsiteX4" y="connsiteY4"/>
-                </a:cxn>
-                <a:cxn ang="0">
-                  <a:pos x="connsiteX5" y="connsiteY5"/>
-                </a:cxn>
-                <a:cxn ang="0">
-                  <a:pos x="connsiteX6" y="connsiteY6"/>
-                </a:cxn>
-                <a:cxn ang="0">
-                  <a:pos x="connsiteX7" y="connsiteY7"/>
-                </a:cxn>
-                <a:cxn ang="0">
-                  <a:pos x="connsiteX8" y="connsiteY8"/>
-                </a:cxn>
-              </a:cxnLst>
-              <a:rect l="l" t="t" r="r" b="b"/>
-              <a:pathLst>
-                <a:path w="3040290" h="912745">
-                  <a:moveTo>
-                    <a:pt x="0" y="152127"/>
-                  </a:moveTo>
-                  <a:cubicBezTo>
-                    <a:pt x="0" y="68110"/>
-                    <a:pt x="68110" y="0"/>
-                    <a:pt x="152127" y="0"/>
-                  </a:cubicBezTo>
-                  <a:lnTo>
-                    <a:pt x="2888163" y="0"/>
-                  </a:lnTo>
-                  <a:cubicBezTo>
-                    <a:pt x="2972180" y="0"/>
-                    <a:pt x="3040290" y="68110"/>
-                    <a:pt x="3040290" y="152127"/>
-                  </a:cubicBezTo>
-                  <a:lnTo>
-                    <a:pt x="3040290" y="760618"/>
-                  </a:lnTo>
-                  <a:cubicBezTo>
-                    <a:pt x="3040290" y="844635"/>
-                    <a:pt x="2972180" y="912745"/>
-                    <a:pt x="2888163" y="912745"/>
-                  </a:cubicBezTo>
-                  <a:lnTo>
-                    <a:pt x="152127" y="912745"/>
-                  </a:lnTo>
-                  <a:cubicBezTo>
-                    <a:pt x="68110" y="912745"/>
-                    <a:pt x="0" y="844635"/>
-                    <a:pt x="0" y="760618"/>
-                  </a:cubicBezTo>
-                  <a:lnTo>
-                    <a:pt x="0" y="152127"/>
-                  </a:lnTo>
-                  <a:close/>
-                </a:path>
-              </a:pathLst>
-            </a:custGeom>
-          </p:spPr>
-          <p:style>
-            <a:lnRef idx="2">
-              <a:schemeClr val="lt1">
-                <a:hueOff val="0"/>
-                <a:satOff val="0"/>
-                <a:lumOff val="0"/>
-                <a:alphaOff val="0"/>
-              </a:schemeClr>
-            </a:lnRef>
-            <a:fillRef idx="1">
-              <a:schemeClr val="accent5">
-                <a:hueOff val="-3379271"/>
-                <a:satOff val="-8710"/>
-                <a:lumOff val="-5883"/>
-                <a:alphaOff val="0"/>
-              </a:schemeClr>
-            </a:fillRef>
-            <a:effectRef idx="0">
-              <a:schemeClr val="accent5">
-                <a:hueOff val="-3379271"/>
-                <a:satOff val="-8710"/>
-                <a:lumOff val="-5883"/>
-                <a:alphaOff val="0"/>
-              </a:schemeClr>
-            </a:effectRef>
-            <a:fontRef idx="minor">
-              <a:schemeClr val="lt1"/>
-            </a:fontRef>
-          </p:style>
-          <p:txBody>
-            <a:bodyPr spcFirstLastPara="0" vert="horz" wrap="square" lIns="166477" tIns="105517" rIns="166477" bIns="105517" numCol="1" spcCol="1270" anchor="ctr" anchorCtr="0">
-              <a:noAutofit/>
-            </a:bodyPr>
-            <a:lstStyle/>
-            <a:p>
-              <a:pPr marL="0" lvl="0" indent="0" algn="ctr" defTabSz="1422400">
-                <a:lnSpc>
-                  <a:spcPct val="90000"/>
-                </a:lnSpc>
-                <a:spcBef>
-                  <a:spcPct val="0"/>
-                </a:spcBef>
-                <a:spcAft>
-                  <a:spcPct val="35000"/>
-                </a:spcAft>
-                <a:buNone/>
-              </a:pPr>
-              <a:r>
-                <a:rPr lang="en-US" sz="3200" kern="1200" dirty="0"/>
-                <a:t>Ensemble</a:t>
-              </a:r>
-            </a:p>
-          </p:txBody>
-        </p:sp>
-        <p:sp>
-          <p:nvSpPr>
-            <p:cNvPr id="10" name="Freeform: Shape 9">
-              <a:extLst>
-                <a:ext uri="{FF2B5EF4-FFF2-40B4-BE49-F238E27FC236}">
-                  <a16:creationId xmlns:a16="http://schemas.microsoft.com/office/drawing/2014/main" id="{25A575CC-E79F-4C4B-B6AD-EED29F93B51B}"/>
-                </a:ext>
-              </a:extLst>
-            </p:cNvPr>
-            <p:cNvSpPr/>
-            <p:nvPr/>
-          </p:nvSpPr>
-          <p:spPr>
-            <a:xfrm>
-              <a:off x="4913664" y="4655271"/>
-              <a:ext cx="5404960" cy="730196"/>
-            </a:xfrm>
-            <a:custGeom>
-              <a:avLst/>
-              <a:gdLst>
-                <a:gd name="connsiteX0" fmla="*/ 121702 w 730196"/>
-                <a:gd name="connsiteY0" fmla="*/ 0 h 5404960"/>
-                <a:gd name="connsiteX1" fmla="*/ 608494 w 730196"/>
-                <a:gd name="connsiteY1" fmla="*/ 0 h 5404960"/>
-                <a:gd name="connsiteX2" fmla="*/ 730196 w 730196"/>
-                <a:gd name="connsiteY2" fmla="*/ 121702 h 5404960"/>
-                <a:gd name="connsiteX3" fmla="*/ 730196 w 730196"/>
-                <a:gd name="connsiteY3" fmla="*/ 5404960 h 5404960"/>
-                <a:gd name="connsiteX4" fmla="*/ 730196 w 730196"/>
-                <a:gd name="connsiteY4" fmla="*/ 5404960 h 5404960"/>
-                <a:gd name="connsiteX5" fmla="*/ 0 w 730196"/>
-                <a:gd name="connsiteY5" fmla="*/ 5404960 h 5404960"/>
-                <a:gd name="connsiteX6" fmla="*/ 0 w 730196"/>
-                <a:gd name="connsiteY6" fmla="*/ 5404960 h 5404960"/>
-                <a:gd name="connsiteX7" fmla="*/ 0 w 730196"/>
-                <a:gd name="connsiteY7" fmla="*/ 121702 h 5404960"/>
-                <a:gd name="connsiteX8" fmla="*/ 121702 w 730196"/>
-                <a:gd name="connsiteY8" fmla="*/ 0 h 5404960"/>
-              </a:gdLst>
-              <a:ahLst/>
-              <a:cxnLst>
-                <a:cxn ang="0">
-                  <a:pos x="connsiteX0" y="connsiteY0"/>
-                </a:cxn>
-                <a:cxn ang="0">
-                  <a:pos x="connsiteX1" y="connsiteY1"/>
-                </a:cxn>
-                <a:cxn ang="0">
-                  <a:pos x="connsiteX2" y="connsiteY2"/>
-                </a:cxn>
-                <a:cxn ang="0">
-                  <a:pos x="connsiteX3" y="connsiteY3"/>
-                </a:cxn>
-                <a:cxn ang="0">
-                  <a:pos x="connsiteX4" y="connsiteY4"/>
-                </a:cxn>
-                <a:cxn ang="0">
-                  <a:pos x="connsiteX5" y="connsiteY5"/>
-                </a:cxn>
-                <a:cxn ang="0">
-                  <a:pos x="connsiteX6" y="connsiteY6"/>
-                </a:cxn>
-                <a:cxn ang="0">
-                  <a:pos x="connsiteX7" y="connsiteY7"/>
-                </a:cxn>
-                <a:cxn ang="0">
-                  <a:pos x="connsiteX8" y="connsiteY8"/>
-                </a:cxn>
-              </a:cxnLst>
-              <a:rect l="l" t="t" r="r" b="b"/>
-              <a:pathLst>
-                <a:path w="730196" h="5404960">
-                  <a:moveTo>
-                    <a:pt x="730196" y="900849"/>
-                  </a:moveTo>
-                  <a:lnTo>
-                    <a:pt x="730196" y="4504111"/>
-                  </a:lnTo>
-                  <a:cubicBezTo>
-                    <a:pt x="730196" y="5001633"/>
-                    <a:pt x="722835" y="5404956"/>
-                    <a:pt x="713754" y="5404956"/>
-                  </a:cubicBezTo>
-                  <a:lnTo>
-                    <a:pt x="0" y="5404956"/>
-                  </a:lnTo>
-                  <a:lnTo>
-                    <a:pt x="0" y="5404956"/>
-                  </a:lnTo>
-                  <a:lnTo>
-                    <a:pt x="0" y="4"/>
-                  </a:lnTo>
-                  <a:lnTo>
-                    <a:pt x="0" y="4"/>
-                  </a:lnTo>
-                  <a:lnTo>
-                    <a:pt x="713754" y="4"/>
-                  </a:lnTo>
-                  <a:cubicBezTo>
-                    <a:pt x="722835" y="4"/>
-                    <a:pt x="730196" y="403327"/>
-                    <a:pt x="730196" y="900849"/>
-                  </a:cubicBezTo>
-                  <a:close/>
-                </a:path>
-              </a:pathLst>
-            </a:custGeom>
-          </p:spPr>
-          <p:style>
-            <a:lnRef idx="2">
-              <a:schemeClr val="accent5">
-                <a:tint val="40000"/>
-                <a:alpha val="90000"/>
-                <a:hueOff val="-5054821"/>
-                <a:satOff val="-17124"/>
-                <a:lumOff val="-2196"/>
-                <a:alphaOff val="0"/>
-              </a:schemeClr>
-            </a:lnRef>
-            <a:fillRef idx="1">
-              <a:schemeClr val="accent5">
-                <a:tint val="40000"/>
-                <a:alpha val="90000"/>
-                <a:hueOff val="-5054821"/>
-                <a:satOff val="-17124"/>
-                <a:lumOff val="-2196"/>
-                <a:alphaOff val="0"/>
-              </a:schemeClr>
-            </a:fillRef>
-            <a:effectRef idx="0">
-              <a:schemeClr val="accent5">
-                <a:tint val="40000"/>
-                <a:alpha val="90000"/>
-                <a:hueOff val="-5054821"/>
-                <a:satOff val="-17124"/>
-                <a:lumOff val="-2196"/>
-                <a:alphaOff val="0"/>
-              </a:schemeClr>
-            </a:effectRef>
-            <a:fontRef idx="minor">
-              <a:schemeClr val="dk1">
-                <a:hueOff val="0"/>
-                <a:satOff val="0"/>
-                <a:lumOff val="0"/>
-                <a:alphaOff val="0"/>
-              </a:schemeClr>
-            </a:fontRef>
-          </p:style>
-          <p:txBody>
-            <a:bodyPr spcFirstLastPara="0" vert="horz" wrap="square" lIns="76201" tIns="73745" rIns="111844" bIns="73745" numCol="1" spcCol="1270" anchor="ctr" anchorCtr="0">
-              <a:noAutofit/>
-            </a:bodyPr>
-            <a:lstStyle/>
-            <a:p>
-              <a:pPr marL="228600" lvl="1" indent="-228600" algn="l" defTabSz="889000">
-                <a:lnSpc>
-                  <a:spcPct val="90000"/>
-                </a:lnSpc>
-                <a:spcBef>
-                  <a:spcPct val="0"/>
-                </a:spcBef>
-                <a:spcAft>
-                  <a:spcPct val="15000"/>
-                </a:spcAft>
-                <a:buChar char="•"/>
-              </a:pPr>
-              <a:r>
-                <a:rPr lang="en-US" sz="2000" kern="1200" dirty="0"/>
-                <a:t>Iteratively impute long timescales using model ensemble</a:t>
-              </a:r>
-            </a:p>
-          </p:txBody>
-        </p:sp>
-        <p:sp>
-          <p:nvSpPr>
-            <p:cNvPr id="11" name="Freeform: Shape 10">
-              <a:extLst>
-                <a:ext uri="{FF2B5EF4-FFF2-40B4-BE49-F238E27FC236}">
-                  <a16:creationId xmlns:a16="http://schemas.microsoft.com/office/drawing/2014/main" id="{F3E21E11-3306-466C-9025-100F966178C3}"/>
-                </a:ext>
-              </a:extLst>
-            </p:cNvPr>
-            <p:cNvSpPr/>
-            <p:nvPr/>
-          </p:nvSpPr>
-          <p:spPr>
-            <a:xfrm>
-              <a:off x="1873374" y="4567925"/>
-              <a:ext cx="3040290" cy="912745"/>
-            </a:xfrm>
-            <a:custGeom>
-              <a:avLst/>
-              <a:gdLst>
-                <a:gd name="connsiteX0" fmla="*/ 0 w 3040290"/>
-                <a:gd name="connsiteY0" fmla="*/ 152127 h 912745"/>
-                <a:gd name="connsiteX1" fmla="*/ 152127 w 3040290"/>
-                <a:gd name="connsiteY1" fmla="*/ 0 h 912745"/>
-                <a:gd name="connsiteX2" fmla="*/ 2888163 w 3040290"/>
-                <a:gd name="connsiteY2" fmla="*/ 0 h 912745"/>
-                <a:gd name="connsiteX3" fmla="*/ 3040290 w 3040290"/>
-                <a:gd name="connsiteY3" fmla="*/ 152127 h 912745"/>
-                <a:gd name="connsiteX4" fmla="*/ 3040290 w 3040290"/>
-                <a:gd name="connsiteY4" fmla="*/ 760618 h 912745"/>
-                <a:gd name="connsiteX5" fmla="*/ 2888163 w 3040290"/>
-                <a:gd name="connsiteY5" fmla="*/ 912745 h 912745"/>
-                <a:gd name="connsiteX6" fmla="*/ 152127 w 3040290"/>
-                <a:gd name="connsiteY6" fmla="*/ 912745 h 912745"/>
-                <a:gd name="connsiteX7" fmla="*/ 0 w 3040290"/>
-                <a:gd name="connsiteY7" fmla="*/ 760618 h 912745"/>
-                <a:gd name="connsiteX8" fmla="*/ 0 w 3040290"/>
-                <a:gd name="connsiteY8" fmla="*/ 152127 h 912745"/>
-              </a:gdLst>
-              <a:ahLst/>
-              <a:cxnLst>
-                <a:cxn ang="0">
-                  <a:pos x="connsiteX0" y="connsiteY0"/>
-                </a:cxn>
-                <a:cxn ang="0">
-                  <a:pos x="connsiteX1" y="connsiteY1"/>
-                </a:cxn>
-                <a:cxn ang="0">
-                  <a:pos x="connsiteX2" y="connsiteY2"/>
-                </a:cxn>
-                <a:cxn ang="0">
-                  <a:pos x="connsiteX3" y="connsiteY3"/>
-                </a:cxn>
-                <a:cxn ang="0">
-                  <a:pos x="connsiteX4" y="connsiteY4"/>
-                </a:cxn>
-                <a:cxn ang="0">
-                  <a:pos x="connsiteX5" y="connsiteY5"/>
-                </a:cxn>
-                <a:cxn ang="0">
-                  <a:pos x="connsiteX6" y="connsiteY6"/>
-                </a:cxn>
-                <a:cxn ang="0">
-                  <a:pos x="connsiteX7" y="connsiteY7"/>
-                </a:cxn>
-                <a:cxn ang="0">
-                  <a:pos x="connsiteX8" y="connsiteY8"/>
-                </a:cxn>
-              </a:cxnLst>
-              <a:rect l="l" t="t" r="r" b="b"/>
-              <a:pathLst>
-                <a:path w="3040290" h="912745">
-                  <a:moveTo>
-                    <a:pt x="0" y="152127"/>
-                  </a:moveTo>
-                  <a:cubicBezTo>
-                    <a:pt x="0" y="68110"/>
-                    <a:pt x="68110" y="0"/>
-                    <a:pt x="152127" y="0"/>
-                  </a:cubicBezTo>
-                  <a:lnTo>
-                    <a:pt x="2888163" y="0"/>
-                  </a:lnTo>
-                  <a:cubicBezTo>
-                    <a:pt x="2972180" y="0"/>
-                    <a:pt x="3040290" y="68110"/>
-                    <a:pt x="3040290" y="152127"/>
-                  </a:cubicBezTo>
-                  <a:lnTo>
-                    <a:pt x="3040290" y="760618"/>
-                  </a:lnTo>
-                  <a:cubicBezTo>
-                    <a:pt x="3040290" y="844635"/>
-                    <a:pt x="2972180" y="912745"/>
-                    <a:pt x="2888163" y="912745"/>
-                  </a:cubicBezTo>
-                  <a:lnTo>
-                    <a:pt x="152127" y="912745"/>
-                  </a:lnTo>
-                  <a:cubicBezTo>
-                    <a:pt x="68110" y="912745"/>
-                    <a:pt x="0" y="844635"/>
-                    <a:pt x="0" y="760618"/>
-                  </a:cubicBezTo>
-                  <a:lnTo>
-                    <a:pt x="0" y="152127"/>
-                  </a:lnTo>
-                  <a:close/>
-                </a:path>
-              </a:pathLst>
-            </a:custGeom>
-          </p:spPr>
-          <p:style>
-            <a:lnRef idx="2">
-              <a:schemeClr val="lt1">
-                <a:hueOff val="0"/>
-                <a:satOff val="0"/>
-                <a:lumOff val="0"/>
-                <a:alphaOff val="0"/>
-              </a:schemeClr>
-            </a:lnRef>
-            <a:fillRef idx="1">
-              <a:schemeClr val="accent5">
-                <a:hueOff val="-5068907"/>
-                <a:satOff val="-13064"/>
-                <a:lumOff val="-8824"/>
-                <a:alphaOff val="0"/>
-              </a:schemeClr>
-            </a:fillRef>
-            <a:effectRef idx="0">
-              <a:schemeClr val="accent5">
-                <a:hueOff val="-5068907"/>
-                <a:satOff val="-13064"/>
-                <a:lumOff val="-8824"/>
-                <a:alphaOff val="0"/>
-              </a:schemeClr>
-            </a:effectRef>
-            <a:fontRef idx="minor">
-              <a:schemeClr val="lt1"/>
-            </a:fontRef>
-          </p:style>
-          <p:txBody>
-            <a:bodyPr spcFirstLastPara="0" vert="horz" wrap="square" lIns="166477" tIns="105517" rIns="166477" bIns="105517" numCol="1" spcCol="1270" anchor="ctr" anchorCtr="0">
-              <a:noAutofit/>
-            </a:bodyPr>
-            <a:lstStyle/>
-            <a:p>
-              <a:pPr marL="0" lvl="0" indent="0" algn="ctr" defTabSz="1422400">
-                <a:lnSpc>
-                  <a:spcPct val="90000"/>
-                </a:lnSpc>
-                <a:spcBef>
-                  <a:spcPct val="0"/>
-                </a:spcBef>
-                <a:spcAft>
-                  <a:spcPct val="35000"/>
-                </a:spcAft>
-                <a:buNone/>
-              </a:pPr>
-              <a:r>
-                <a:rPr lang="en-US" sz="3200" kern="1200" dirty="0"/>
-                <a:t>Imputation</a:t>
-              </a:r>
-            </a:p>
-          </p:txBody>
-        </p:sp>
-        <p:sp>
-          <p:nvSpPr>
-            <p:cNvPr id="12" name="Freeform: Shape 11">
-              <a:extLst>
-                <a:ext uri="{FF2B5EF4-FFF2-40B4-BE49-F238E27FC236}">
-                  <a16:creationId xmlns:a16="http://schemas.microsoft.com/office/drawing/2014/main" id="{AA50689B-FBB3-40D2-B92A-87C87228E5D5}"/>
-                </a:ext>
-              </a:extLst>
-            </p:cNvPr>
-            <p:cNvSpPr/>
-            <p:nvPr/>
-          </p:nvSpPr>
-          <p:spPr>
-            <a:xfrm>
-              <a:off x="4913664" y="5617583"/>
-              <a:ext cx="5404960" cy="730196"/>
-            </a:xfrm>
-            <a:custGeom>
-              <a:avLst/>
-              <a:gdLst>
-                <a:gd name="connsiteX0" fmla="*/ 121702 w 730196"/>
-                <a:gd name="connsiteY0" fmla="*/ 0 h 5404960"/>
-                <a:gd name="connsiteX1" fmla="*/ 608494 w 730196"/>
-                <a:gd name="connsiteY1" fmla="*/ 0 h 5404960"/>
-                <a:gd name="connsiteX2" fmla="*/ 730196 w 730196"/>
-                <a:gd name="connsiteY2" fmla="*/ 121702 h 5404960"/>
-                <a:gd name="connsiteX3" fmla="*/ 730196 w 730196"/>
-                <a:gd name="connsiteY3" fmla="*/ 5404960 h 5404960"/>
-                <a:gd name="connsiteX4" fmla="*/ 730196 w 730196"/>
-                <a:gd name="connsiteY4" fmla="*/ 5404960 h 5404960"/>
-                <a:gd name="connsiteX5" fmla="*/ 0 w 730196"/>
-                <a:gd name="connsiteY5" fmla="*/ 5404960 h 5404960"/>
-                <a:gd name="connsiteX6" fmla="*/ 0 w 730196"/>
-                <a:gd name="connsiteY6" fmla="*/ 5404960 h 5404960"/>
-                <a:gd name="connsiteX7" fmla="*/ 0 w 730196"/>
-                <a:gd name="connsiteY7" fmla="*/ 121702 h 5404960"/>
-                <a:gd name="connsiteX8" fmla="*/ 121702 w 730196"/>
-                <a:gd name="connsiteY8" fmla="*/ 0 h 5404960"/>
-              </a:gdLst>
-              <a:ahLst/>
-              <a:cxnLst>
-                <a:cxn ang="0">
-                  <a:pos x="connsiteX0" y="connsiteY0"/>
-                </a:cxn>
-                <a:cxn ang="0">
-                  <a:pos x="connsiteX1" y="connsiteY1"/>
-                </a:cxn>
-                <a:cxn ang="0">
-                  <a:pos x="connsiteX2" y="connsiteY2"/>
-                </a:cxn>
-                <a:cxn ang="0">
-                  <a:pos x="connsiteX3" y="connsiteY3"/>
-                </a:cxn>
-                <a:cxn ang="0">
-                  <a:pos x="connsiteX4" y="connsiteY4"/>
-                </a:cxn>
-                <a:cxn ang="0">
-                  <a:pos x="connsiteX5" y="connsiteY5"/>
-                </a:cxn>
-                <a:cxn ang="0">
-                  <a:pos x="connsiteX6" y="connsiteY6"/>
-                </a:cxn>
-                <a:cxn ang="0">
-                  <a:pos x="connsiteX7" y="connsiteY7"/>
-                </a:cxn>
-                <a:cxn ang="0">
-                  <a:pos x="connsiteX8" y="connsiteY8"/>
-                </a:cxn>
-              </a:cxnLst>
-              <a:rect l="l" t="t" r="r" b="b"/>
-              <a:pathLst>
-                <a:path w="730196" h="5404960">
-                  <a:moveTo>
-                    <a:pt x="730196" y="900849"/>
-                  </a:moveTo>
-                  <a:lnTo>
-                    <a:pt x="730196" y="4504111"/>
-                  </a:lnTo>
-                  <a:cubicBezTo>
-                    <a:pt x="730196" y="5001633"/>
-                    <a:pt x="722835" y="5404956"/>
-                    <a:pt x="713754" y="5404956"/>
-                  </a:cubicBezTo>
-                  <a:lnTo>
-                    <a:pt x="0" y="5404956"/>
-                  </a:lnTo>
-                  <a:lnTo>
-                    <a:pt x="0" y="5404956"/>
-                  </a:lnTo>
-                  <a:lnTo>
-                    <a:pt x="0" y="4"/>
-                  </a:lnTo>
-                  <a:lnTo>
-                    <a:pt x="0" y="4"/>
-                  </a:lnTo>
-                  <a:lnTo>
-                    <a:pt x="713754" y="4"/>
-                  </a:lnTo>
-                  <a:cubicBezTo>
-                    <a:pt x="722835" y="4"/>
-                    <a:pt x="730196" y="403327"/>
-                    <a:pt x="730196" y="900849"/>
-                  </a:cubicBezTo>
-                  <a:close/>
-                </a:path>
-              </a:pathLst>
-            </a:custGeom>
-          </p:spPr>
-          <p:style>
-            <a:lnRef idx="2">
-              <a:schemeClr val="accent5">
-                <a:tint val="40000"/>
-                <a:alpha val="90000"/>
-                <a:hueOff val="-6739762"/>
-                <a:satOff val="-22832"/>
-                <a:lumOff val="-2928"/>
-                <a:alphaOff val="0"/>
-              </a:schemeClr>
-            </a:lnRef>
-            <a:fillRef idx="1">
-              <a:schemeClr val="accent5">
-                <a:tint val="40000"/>
-                <a:alpha val="90000"/>
-                <a:hueOff val="-6739762"/>
-                <a:satOff val="-22832"/>
-                <a:lumOff val="-2928"/>
-                <a:alphaOff val="0"/>
-              </a:schemeClr>
-            </a:fillRef>
-            <a:effectRef idx="0">
-              <a:schemeClr val="accent5">
-                <a:tint val="40000"/>
-                <a:alpha val="90000"/>
-                <a:hueOff val="-6739762"/>
-                <a:satOff val="-22832"/>
-                <a:lumOff val="-2928"/>
-                <a:alphaOff val="0"/>
-              </a:schemeClr>
-            </a:effectRef>
-            <a:fontRef idx="minor">
-              <a:schemeClr val="dk1">
-                <a:hueOff val="0"/>
-                <a:satOff val="0"/>
-                <a:lumOff val="0"/>
-                <a:alphaOff val="0"/>
-              </a:schemeClr>
-            </a:fontRef>
-          </p:style>
-          <p:txBody>
-            <a:bodyPr spcFirstLastPara="0" vert="horz" wrap="square" lIns="76201" tIns="73745" rIns="111844" bIns="73745" numCol="1" spcCol="1270" anchor="ctr" anchorCtr="0">
-              <a:noAutofit/>
-            </a:bodyPr>
-            <a:lstStyle/>
-            <a:p>
-              <a:pPr marL="228600" lvl="1" indent="-228600" algn="l" defTabSz="889000">
-                <a:lnSpc>
-                  <a:spcPct val="90000"/>
-                </a:lnSpc>
-                <a:spcBef>
-                  <a:spcPct val="0"/>
-                </a:spcBef>
-                <a:spcAft>
-                  <a:spcPct val="15000"/>
-                </a:spcAft>
-                <a:buChar char="•"/>
-              </a:pPr>
-              <a:r>
-                <a:rPr lang="en-US" sz="2000" kern="1200" dirty="0"/>
-                <a:t>Detect remaining bad frames with physiological thresholds</a:t>
-              </a:r>
-            </a:p>
-          </p:txBody>
-        </p:sp>
-        <p:sp>
-          <p:nvSpPr>
-            <p:cNvPr id="13" name="Freeform: Shape 12">
-              <a:extLst>
-                <a:ext uri="{FF2B5EF4-FFF2-40B4-BE49-F238E27FC236}">
-                  <a16:creationId xmlns:a16="http://schemas.microsoft.com/office/drawing/2014/main" id="{0AF1266C-B8C1-4D80-8689-B98BFF99905C}"/>
-                </a:ext>
-              </a:extLst>
-            </p:cNvPr>
-            <p:cNvSpPr/>
-            <p:nvPr/>
-          </p:nvSpPr>
-          <p:spPr>
-            <a:xfrm>
-              <a:off x="1873374" y="5526308"/>
-              <a:ext cx="3040290" cy="912745"/>
-            </a:xfrm>
-            <a:custGeom>
-              <a:avLst/>
-              <a:gdLst>
-                <a:gd name="connsiteX0" fmla="*/ 0 w 3040290"/>
-                <a:gd name="connsiteY0" fmla="*/ 152127 h 912745"/>
-                <a:gd name="connsiteX1" fmla="*/ 152127 w 3040290"/>
-                <a:gd name="connsiteY1" fmla="*/ 0 h 912745"/>
-                <a:gd name="connsiteX2" fmla="*/ 2888163 w 3040290"/>
-                <a:gd name="connsiteY2" fmla="*/ 0 h 912745"/>
-                <a:gd name="connsiteX3" fmla="*/ 3040290 w 3040290"/>
-                <a:gd name="connsiteY3" fmla="*/ 152127 h 912745"/>
-                <a:gd name="connsiteX4" fmla="*/ 3040290 w 3040290"/>
-                <a:gd name="connsiteY4" fmla="*/ 760618 h 912745"/>
-                <a:gd name="connsiteX5" fmla="*/ 2888163 w 3040290"/>
-                <a:gd name="connsiteY5" fmla="*/ 912745 h 912745"/>
-                <a:gd name="connsiteX6" fmla="*/ 152127 w 3040290"/>
-                <a:gd name="connsiteY6" fmla="*/ 912745 h 912745"/>
-                <a:gd name="connsiteX7" fmla="*/ 0 w 3040290"/>
-                <a:gd name="connsiteY7" fmla="*/ 760618 h 912745"/>
-                <a:gd name="connsiteX8" fmla="*/ 0 w 3040290"/>
-                <a:gd name="connsiteY8" fmla="*/ 152127 h 912745"/>
-              </a:gdLst>
-              <a:ahLst/>
-              <a:cxnLst>
-                <a:cxn ang="0">
-                  <a:pos x="connsiteX0" y="connsiteY0"/>
-                </a:cxn>
-                <a:cxn ang="0">
-                  <a:pos x="connsiteX1" y="connsiteY1"/>
-                </a:cxn>
-                <a:cxn ang="0">
-                  <a:pos x="connsiteX2" y="connsiteY2"/>
-                </a:cxn>
-                <a:cxn ang="0">
-                  <a:pos x="connsiteX3" y="connsiteY3"/>
-                </a:cxn>
-                <a:cxn ang="0">
-                  <a:pos x="connsiteX4" y="connsiteY4"/>
-                </a:cxn>
-                <a:cxn ang="0">
-                  <a:pos x="connsiteX5" y="connsiteY5"/>
-                </a:cxn>
-                <a:cxn ang="0">
-                  <a:pos x="connsiteX6" y="connsiteY6"/>
-                </a:cxn>
-                <a:cxn ang="0">
-                  <a:pos x="connsiteX7" y="connsiteY7"/>
-                </a:cxn>
-                <a:cxn ang="0">
-                  <a:pos x="connsiteX8" y="connsiteY8"/>
-                </a:cxn>
-              </a:cxnLst>
-              <a:rect l="l" t="t" r="r" b="b"/>
-              <a:pathLst>
-                <a:path w="3040290" h="912745">
-                  <a:moveTo>
-                    <a:pt x="0" y="152127"/>
-                  </a:moveTo>
-                  <a:cubicBezTo>
-                    <a:pt x="0" y="68110"/>
-                    <a:pt x="68110" y="0"/>
-                    <a:pt x="152127" y="0"/>
-                  </a:cubicBezTo>
-                  <a:lnTo>
-                    <a:pt x="2888163" y="0"/>
-                  </a:lnTo>
-                  <a:cubicBezTo>
-                    <a:pt x="2972180" y="0"/>
-                    <a:pt x="3040290" y="68110"/>
-                    <a:pt x="3040290" y="152127"/>
-                  </a:cubicBezTo>
-                  <a:lnTo>
-                    <a:pt x="3040290" y="760618"/>
-                  </a:lnTo>
-                  <a:cubicBezTo>
-                    <a:pt x="3040290" y="844635"/>
-                    <a:pt x="2972180" y="912745"/>
-                    <a:pt x="2888163" y="912745"/>
-                  </a:cubicBezTo>
-                  <a:lnTo>
-                    <a:pt x="152127" y="912745"/>
-                  </a:lnTo>
-                  <a:cubicBezTo>
-                    <a:pt x="68110" y="912745"/>
-                    <a:pt x="0" y="844635"/>
-                    <a:pt x="0" y="760618"/>
-                  </a:cubicBezTo>
-                  <a:lnTo>
-                    <a:pt x="0" y="152127"/>
-                  </a:lnTo>
-                  <a:close/>
-                </a:path>
-              </a:pathLst>
-            </a:custGeom>
-          </p:spPr>
-          <p:style>
-            <a:lnRef idx="2">
-              <a:schemeClr val="lt1">
-                <a:hueOff val="0"/>
-                <a:satOff val="0"/>
-                <a:lumOff val="0"/>
-                <a:alphaOff val="0"/>
-              </a:schemeClr>
-            </a:lnRef>
-            <a:fillRef idx="1">
-              <a:schemeClr val="accent5">
-                <a:hueOff val="-6758543"/>
-                <a:satOff val="-17419"/>
-                <a:lumOff val="-11765"/>
-                <a:alphaOff val="0"/>
-              </a:schemeClr>
-            </a:fillRef>
-            <a:effectRef idx="0">
-              <a:schemeClr val="accent5">
-                <a:hueOff val="-6758543"/>
-                <a:satOff val="-17419"/>
-                <a:lumOff val="-11765"/>
-                <a:alphaOff val="0"/>
-              </a:schemeClr>
-            </a:effectRef>
-            <a:fontRef idx="minor">
-              <a:schemeClr val="lt1"/>
-            </a:fontRef>
-          </p:style>
-          <p:txBody>
-            <a:bodyPr spcFirstLastPara="0" vert="horz" wrap="square" lIns="166477" tIns="105517" rIns="166477" bIns="105517" numCol="1" spcCol="1270" anchor="ctr" anchorCtr="0">
-              <a:noAutofit/>
-            </a:bodyPr>
-            <a:lstStyle/>
-            <a:p>
-              <a:pPr marL="0" lvl="0" indent="0" algn="ctr" defTabSz="1422400">
-                <a:lnSpc>
-                  <a:spcPct val="90000"/>
-                </a:lnSpc>
-                <a:spcBef>
-                  <a:spcPct val="0"/>
-                </a:spcBef>
-                <a:spcAft>
-                  <a:spcPct val="35000"/>
-                </a:spcAft>
-                <a:buNone/>
-              </a:pPr>
-              <a:r>
-                <a:rPr lang="en-US" sz="3200" kern="1200" dirty="0"/>
-                <a:t>Postprocessing</a:t>
-              </a:r>
-            </a:p>
-          </p:txBody>
-        </p:sp>
-      </p:grpSp>
-    </p:spTree>
-    <p:extLst>
-      <p:ext uri="{BB962C8B-B14F-4D97-AF65-F5344CB8AC3E}">
-        <p14:creationId xmlns:p14="http://schemas.microsoft.com/office/powerpoint/2010/main" val="4055878245"/>
-      </p:ext>
-    </p:extLst>
-  </p:cSld>
-  <p:clrMapOvr>
-    <a:masterClrMapping/>
-  </p:clrMapOvr>
-</p:sld>
 </file>
 
 <file path=ppt/theme/theme1.xml><?xml version="1.0" encoding="utf-8"?>

</xml_diff>